<commit_message>
Change component. Add new sequence
</commit_message>
<xml_diff>
--- a/Project/Views/SistemaSeparacionAudio.views.pptx
+++ b/Project/Views/SistemaSeparacionAudio.views.pptx
@@ -28,21 +28,23 @@
     <p:sldId id="276" r:id="rId22"/>
     <p:sldId id="277" r:id="rId23"/>
     <p:sldId id="278" r:id="rId24"/>
+    <p:sldId id="279" r:id="rId25"/>
+    <p:sldId id="280" r:id="rId26"/>
   </p:sldIdLst>
   <p:sldSz cx="18288000" cy="10287000"/>
   <p:notesSz cx="6858000" cy="9144000"/>
   <p:embeddedFontLst>
     <p:embeddedFont>
       <p:font typeface="Open Sans" panose="020B0606030504020204" pitchFamily="34" charset="0"/>
-      <p:regular r:id="rId25"/>
+      <p:regular r:id="rId27"/>
     </p:embeddedFont>
     <p:embeddedFont>
-      <p:font typeface="Open Sans Bold" panose="020B0604020202020204" charset="0"/>
-      <p:regular r:id="rId26"/>
+      <p:font typeface="Open Sans Bold" panose="020B0806030504020204" charset="0"/>
+      <p:regular r:id="rId28"/>
     </p:embeddedFont>
     <p:embeddedFont>
       <p:font typeface="Open Sans Italics" panose="020B0604020202020204" charset="0"/>
-      <p:regular r:id="rId27"/>
+      <p:regular r:id="rId29"/>
     </p:embeddedFont>
   </p:embeddedFontLst>
   <p:defaultTextStyle>
@@ -339,7 +341,7 @@
             <a:fld id="{1D8BD707-D9CF-40AE-B4C6-C98DA3205C09}" type="datetimeFigureOut">
               <a:rPr lang="en-US" smtClean="0"/>
               <a:pPr/>
-              <a:t>4/23/2025</a:t>
+              <a:t>4/30/2025</a:t>
             </a:fld>
             <a:endParaRPr lang="en-US"/>
           </a:p>
@@ -504,7 +506,7 @@
             <a:fld id="{1D8BD707-D9CF-40AE-B4C6-C98DA3205C09}" type="datetimeFigureOut">
               <a:rPr lang="en-US" smtClean="0"/>
               <a:pPr/>
-              <a:t>4/23/2025</a:t>
+              <a:t>4/30/2025</a:t>
             </a:fld>
             <a:endParaRPr lang="en-US"/>
           </a:p>
@@ -679,7 +681,7 @@
             <a:fld id="{1D8BD707-D9CF-40AE-B4C6-C98DA3205C09}" type="datetimeFigureOut">
               <a:rPr lang="en-US" smtClean="0"/>
               <a:pPr/>
-              <a:t>4/23/2025</a:t>
+              <a:t>4/30/2025</a:t>
             </a:fld>
             <a:endParaRPr lang="en-US"/>
           </a:p>
@@ -844,7 +846,7 @@
             <a:fld id="{1D8BD707-D9CF-40AE-B4C6-C98DA3205C09}" type="datetimeFigureOut">
               <a:rPr lang="en-US" smtClean="0"/>
               <a:pPr/>
-              <a:t>4/23/2025</a:t>
+              <a:t>4/30/2025</a:t>
             </a:fld>
             <a:endParaRPr lang="en-US"/>
           </a:p>
@@ -1086,7 +1088,7 @@
             <a:fld id="{1D8BD707-D9CF-40AE-B4C6-C98DA3205C09}" type="datetimeFigureOut">
               <a:rPr lang="en-US" smtClean="0"/>
               <a:pPr/>
-              <a:t>4/23/2025</a:t>
+              <a:t>4/30/2025</a:t>
             </a:fld>
             <a:endParaRPr lang="en-US"/>
           </a:p>
@@ -1368,7 +1370,7 @@
             <a:fld id="{1D8BD707-D9CF-40AE-B4C6-C98DA3205C09}" type="datetimeFigureOut">
               <a:rPr lang="en-US" smtClean="0"/>
               <a:pPr/>
-              <a:t>4/23/2025</a:t>
+              <a:t>4/30/2025</a:t>
             </a:fld>
             <a:endParaRPr lang="en-US"/>
           </a:p>
@@ -1784,7 +1786,7 @@
             <a:fld id="{1D8BD707-D9CF-40AE-B4C6-C98DA3205C09}" type="datetimeFigureOut">
               <a:rPr lang="en-US" smtClean="0"/>
               <a:pPr/>
-              <a:t>4/23/2025</a:t>
+              <a:t>4/30/2025</a:t>
             </a:fld>
             <a:endParaRPr lang="en-US"/>
           </a:p>
@@ -1898,7 +1900,7 @@
             <a:fld id="{1D8BD707-D9CF-40AE-B4C6-C98DA3205C09}" type="datetimeFigureOut">
               <a:rPr lang="en-US" smtClean="0"/>
               <a:pPr/>
-              <a:t>4/23/2025</a:t>
+              <a:t>4/30/2025</a:t>
             </a:fld>
             <a:endParaRPr lang="en-US"/>
           </a:p>
@@ -1990,7 +1992,7 @@
             <a:fld id="{1D8BD707-D9CF-40AE-B4C6-C98DA3205C09}" type="datetimeFigureOut">
               <a:rPr lang="en-US" smtClean="0"/>
               <a:pPr/>
-              <a:t>4/23/2025</a:t>
+              <a:t>4/30/2025</a:t>
             </a:fld>
             <a:endParaRPr lang="en-US"/>
           </a:p>
@@ -2262,7 +2264,7 @@
             <a:fld id="{1D8BD707-D9CF-40AE-B4C6-C98DA3205C09}" type="datetimeFigureOut">
               <a:rPr lang="en-US" smtClean="0"/>
               <a:pPr/>
-              <a:t>4/23/2025</a:t>
+              <a:t>4/30/2025</a:t>
             </a:fld>
             <a:endParaRPr lang="en-US"/>
           </a:p>
@@ -2511,7 +2513,7 @@
             <a:fld id="{1D8BD707-D9CF-40AE-B4C6-C98DA3205C09}" type="datetimeFigureOut">
               <a:rPr lang="en-US" smtClean="0"/>
               <a:pPr/>
-              <a:t>4/23/2025</a:t>
+              <a:t>4/30/2025</a:t>
             </a:fld>
             <a:endParaRPr lang="en-US"/>
           </a:p>
@@ -2719,7 +2721,7 @@
             <a:fld id="{1D8BD707-D9CF-40AE-B4C6-C98DA3205C09}" type="datetimeFigureOut">
               <a:rPr lang="en-US" smtClean="0"/>
               <a:pPr/>
-              <a:t>4/23/2025</a:t>
+              <a:t>4/30/2025</a:t>
             </a:fld>
             <a:endParaRPr lang="en-US"/>
           </a:p>
@@ -3287,8 +3289,8 @@
         </p:nvSpPr>
         <p:spPr>
           <a:xfrm>
-            <a:off x="1028700" y="2419667"/>
-            <a:ext cx="16230600" cy="5380990"/>
+            <a:off x="1028700" y="2077085"/>
+            <a:ext cx="16230600" cy="7181215"/>
           </a:xfrm>
           <a:prstGeom prst="rect">
             <a:avLst/>
@@ -3315,7 +3317,31 @@
                 <a:cs typeface="Open Sans"/>
                 <a:sym typeface="Open Sans"/>
               </a:rPr>
-              <a:t>El diagrama presenta una arquitectura en capas para la aplicación con su enfoque </a:t>
+              <a:t>El diagrama presenta una arquitectura usando el patrón </a:t>
+            </a:r>
+            <a:r>
+              <a:rPr lang="en-US" sz="3399" b="1">
+                <a:solidFill>
+                  <a:srgbClr val="000000"/>
+                </a:solidFill>
+                <a:latin typeface="Open Sans Bold"/>
+                <a:ea typeface="Open Sans Bold"/>
+                <a:cs typeface="Open Sans Bold"/>
+                <a:sym typeface="Open Sans Bold"/>
+              </a:rPr>
+              <a:t>microkernel </a:t>
+            </a:r>
+            <a:r>
+              <a:rPr lang="en-US" sz="3399">
+                <a:solidFill>
+                  <a:srgbClr val="000000"/>
+                </a:solidFill>
+                <a:latin typeface="Open Sans"/>
+                <a:ea typeface="Open Sans"/>
+                <a:cs typeface="Open Sans"/>
+                <a:sym typeface="Open Sans"/>
+              </a:rPr>
+              <a:t>para la aplicación con su enfoque </a:t>
             </a:r>
             <a:r>
               <a:rPr lang="en-US" sz="3399" i="1">
@@ -3339,7 +3365,7 @@
                 <a:cs typeface="Open Sans"/>
                 <a:sym typeface="Open Sans"/>
               </a:rPr>
-              <a:t> La aplicación utiliza un modelo de IA local para garantizar portabilidad y calidad sin depender de conexión a internet. Las capas incluyen: </a:t>
+              <a:t> Se hace uso de este patrón en base a uno de los </a:t>
             </a:r>
             <a:r>
               <a:rPr lang="en-US" sz="3399" b="1">
@@ -3351,7 +3377,7 @@
                 <a:cs typeface="Open Sans Bold"/>
                 <a:sym typeface="Open Sans Bold"/>
               </a:rPr>
-              <a:t>Presentación (interfaz de usuario), Aplicación (controladores), Lógica (servicios y utilidades) e Infraestructura (interacción con hardware y almacenamiento local)</a:t>
+              <a:t>drivers arquitéctonicos </a:t>
             </a:r>
             <a:r>
               <a:rPr lang="en-US" sz="3399">
@@ -3363,7 +3389,127 @@
                 <a:cs typeface="Open Sans"/>
                 <a:sym typeface="Open Sans"/>
               </a:rPr>
-              <a:t>. En cada una de estas, los diversos componentes contienen una etiqueta que va relacionada a la capa en la que se encuentran y hacen uso de las capas de abajo desde el orden superior como indica la estructura en capas, separando la responsabilidad de cada una en lo posible. </a:t>
+              <a:t>relacionados al aspecto de </a:t>
+            </a:r>
+            <a:r>
+              <a:rPr lang="en-US" sz="3399" b="1">
+                <a:solidFill>
+                  <a:srgbClr val="000000"/>
+                </a:solidFill>
+                <a:latin typeface="Open Sans Bold"/>
+                <a:ea typeface="Open Sans Bold"/>
+                <a:cs typeface="Open Sans Bold"/>
+                <a:sym typeface="Open Sans Bold"/>
+              </a:rPr>
+              <a:t>portability</a:t>
+            </a:r>
+            <a:r>
+              <a:rPr lang="en-US" sz="3399">
+                <a:solidFill>
+                  <a:srgbClr val="000000"/>
+                </a:solidFill>
+                <a:latin typeface="Open Sans"/>
+                <a:ea typeface="Open Sans"/>
+                <a:cs typeface="Open Sans"/>
+                <a:sym typeface="Open Sans"/>
+              </a:rPr>
+              <a:t>. Este planteamiento beneficia implementaciones futuras en otros sistemas operativos y escalamiento a futuro para integraciones </a:t>
+            </a:r>
+            <a:r>
+              <a:rPr lang="en-US" sz="3399" i="1">
+                <a:solidFill>
+                  <a:srgbClr val="000000"/>
+                </a:solidFill>
+                <a:latin typeface="Open Sans Italics"/>
+                <a:ea typeface="Open Sans Italics"/>
+                <a:cs typeface="Open Sans Italics"/>
+                <a:sym typeface="Open Sans Italics"/>
+              </a:rPr>
+              <a:t>online</a:t>
+            </a:r>
+            <a:r>
+              <a:rPr lang="en-US" sz="3399">
+                <a:solidFill>
+                  <a:srgbClr val="000000"/>
+                </a:solidFill>
+                <a:latin typeface="Open Sans"/>
+                <a:ea typeface="Open Sans"/>
+                <a:cs typeface="Open Sans"/>
+                <a:sym typeface="Open Sans"/>
+              </a:rPr>
+              <a:t> como una conexión a un modelo más robusto en la nube. Gracias a esta organización, hay una modularidad mayor, abriendo la posibilidad a implementarlo tanto en escritorio como móvil; su punto más débil respecto a la latencia no es un problema mayor a considerar en el funcionamiento de la aplicación. Por lo cual, también permite otros </a:t>
+            </a:r>
+            <a:r>
+              <a:rPr lang="en-US" sz="3399" b="1">
+                <a:solidFill>
+                  <a:srgbClr val="000000"/>
+                </a:solidFill>
+                <a:latin typeface="Open Sans Bold"/>
+                <a:ea typeface="Open Sans Bold"/>
+                <a:cs typeface="Open Sans Bold"/>
+                <a:sym typeface="Open Sans Bold"/>
+              </a:rPr>
+              <a:t>drivers </a:t>
+            </a:r>
+            <a:r>
+              <a:rPr lang="en-US" sz="3399">
+                <a:solidFill>
+                  <a:srgbClr val="000000"/>
+                </a:solidFill>
+                <a:latin typeface="Open Sans"/>
+                <a:ea typeface="Open Sans"/>
+                <a:cs typeface="Open Sans"/>
+                <a:sym typeface="Open Sans"/>
+              </a:rPr>
+              <a:t>enfocados al modelo como </a:t>
+            </a:r>
+            <a:r>
+              <a:rPr lang="en-US" sz="3399" b="1">
+                <a:solidFill>
+                  <a:srgbClr val="000000"/>
+                </a:solidFill>
+                <a:latin typeface="Open Sans Bold"/>
+                <a:ea typeface="Open Sans Bold"/>
+                <a:cs typeface="Open Sans Bold"/>
+                <a:sym typeface="Open Sans Bold"/>
+              </a:rPr>
+              <a:t>functional suitability </a:t>
+            </a:r>
+            <a:r>
+              <a:rPr lang="en-US" sz="3399">
+                <a:solidFill>
+                  <a:srgbClr val="000000"/>
+                </a:solidFill>
+                <a:latin typeface="Open Sans"/>
+                <a:ea typeface="Open Sans"/>
+                <a:cs typeface="Open Sans"/>
+                <a:sym typeface="Open Sans"/>
+              </a:rPr>
+              <a:t>y </a:t>
+            </a:r>
+            <a:r>
+              <a:rPr lang="en-US" sz="3399" b="1">
+                <a:solidFill>
+                  <a:srgbClr val="000000"/>
+                </a:solidFill>
+                <a:latin typeface="Open Sans Bold"/>
+                <a:ea typeface="Open Sans Bold"/>
+                <a:cs typeface="Open Sans Bold"/>
+                <a:sym typeface="Open Sans Bold"/>
+              </a:rPr>
+              <a:t>performance effiency</a:t>
+            </a:r>
+            <a:r>
+              <a:rPr lang="en-US" sz="3399">
+                <a:solidFill>
+                  <a:srgbClr val="000000"/>
+                </a:solidFill>
+                <a:latin typeface="Open Sans"/>
+                <a:ea typeface="Open Sans"/>
+                <a:cs typeface="Open Sans"/>
+                <a:sym typeface="Open Sans"/>
+              </a:rPr>
+              <a:t>, poder ajustarse sin problema, sin afectar otros aspectos de la aplicación. </a:t>
             </a:r>
           </a:p>
         </p:txBody>
@@ -3442,8 +3588,8 @@
         </p:nvSpPr>
         <p:spPr>
           <a:xfrm>
-            <a:off x="1038225" y="1357948"/>
-            <a:ext cx="16230600" cy="5380990"/>
+            <a:off x="1038225" y="1305560"/>
+            <a:ext cx="16230600" cy="8981440"/>
           </a:xfrm>
           <a:prstGeom prst="rect">
             <a:avLst/>
@@ -3460,34 +3606,7 @@
                 <a:spcPts val="4759"/>
               </a:lnSpc>
             </a:pPr>
-            <a:r>
-              <a:rPr lang="en-US" sz="3399" b="1">
-                <a:solidFill>
-                  <a:srgbClr val="000000"/>
-                </a:solidFill>
-                <a:latin typeface="Open Sans Bold"/>
-                <a:ea typeface="Open Sans Bold"/>
-                <a:cs typeface="Open Sans Bold"/>
-                <a:sym typeface="Open Sans Bold"/>
-              </a:rPr>
-              <a:t>Capa de Presentación:</a:t>
-            </a:r>
-          </a:p>
-          <a:p>
-            <a:pPr algn="just">
-              <a:lnSpc>
-                <a:spcPts val="4759"/>
-              </a:lnSpc>
-            </a:pPr>
-            <a:endParaRPr lang="en-US" sz="3399" b="1">
-              <a:solidFill>
-                <a:srgbClr val="000000"/>
-              </a:solidFill>
-              <a:latin typeface="Open Sans Bold"/>
-              <a:ea typeface="Open Sans Bold"/>
-              <a:cs typeface="Open Sans Bold"/>
-              <a:sym typeface="Open Sans Bold"/>
-            </a:endParaRPr>
+            <a:endParaRPr/>
           </a:p>
           <a:p>
             <a:pPr marL="734059" lvl="1" indent="-367030" algn="just">
@@ -3507,7 +3626,7 @@
                 <a:cs typeface="Open Sans Bold"/>
                 <a:sym typeface="Open Sans Bold"/>
               </a:rPr>
-              <a:t>Captura de Audio:</a:t>
+              <a:t>Presentación de la aplicaicón:</a:t>
             </a:r>
             <a:r>
               <a:rPr lang="en-US" sz="3399">
@@ -3519,7 +3638,7 @@
                 <a:cs typeface="Open Sans"/>
                 <a:sym typeface="Open Sans"/>
               </a:rPr>
-              <a:t> Interfaz donde el usuario puede elegir si grabar o subir un archivo de audio del almacenamiento local.</a:t>
+              <a:t> Interfaz gráfica con la que el usuario interectuará para acceder a las funciones propuesta y que debe proporcionar un flujo con correcta usabilidad para permitir el propuesto en el diagrama de actividades.</a:t>
             </a:r>
           </a:p>
           <a:p>
@@ -3540,7 +3659,7 @@
                 <a:cs typeface="Open Sans Bold"/>
                 <a:sym typeface="Open Sans Bold"/>
               </a:rPr>
-              <a:t>Editor de Pistas:</a:t>
+              <a:t>Separador de Fuentes: </a:t>
             </a:r>
             <a:r>
               <a:rPr lang="en-US" sz="3399">
@@ -3552,7 +3671,7 @@
                 <a:cs typeface="Open Sans"/>
                 <a:sym typeface="Open Sans"/>
               </a:rPr>
-              <a:t> Interfaz para editar propiedades de las pistas extraídas, también es por donde se accede a las opciones de guardar cambios y exportar.</a:t>
+              <a:t>Este se encargará de tratar las peticiones hechas por el cliente (interfaz de usuario) y orquestar qué plugins se deberán llamar como también validar que los datos básicos se envíen correctamente a estas interfaces.</a:t>
             </a:r>
           </a:p>
           <a:p>
@@ -3564,6 +3683,18 @@
               <a:buChar char="•"/>
             </a:pPr>
             <a:r>
+              <a:rPr lang="en-US" sz="3399">
+                <a:solidFill>
+                  <a:srgbClr val="000000"/>
+                </a:solidFill>
+                <a:latin typeface="Open Sans"/>
+                <a:ea typeface="Open Sans"/>
+                <a:cs typeface="Open Sans"/>
+                <a:sym typeface="Open Sans"/>
+              </a:rPr>
+              <a:t> </a:t>
+            </a:r>
+            <a:r>
               <a:rPr lang="en-US" sz="3399" b="1">
                 <a:solidFill>
                   <a:srgbClr val="000000"/>
@@ -3573,7 +3704,7 @@
                 <a:cs typeface="Open Sans Bold"/>
                 <a:sym typeface="Open Sans Bold"/>
               </a:rPr>
-              <a:t>Historial</a:t>
+              <a:t>Manejador de Plugins: </a:t>
             </a:r>
             <a:r>
               <a:rPr lang="en-US" sz="3399">
@@ -3585,7 +3716,31 @@
                 <a:cs typeface="Open Sans"/>
                 <a:sym typeface="Open Sans"/>
               </a:rPr>
-              <a:t>: Muestra un registro de las separaciones guardadas.</a:t>
+              <a:t>Acá se registran las interfaces que se implementan y que son llamadas desde el </a:t>
+            </a:r>
+            <a:r>
+              <a:rPr lang="en-US" sz="3399" b="1">
+                <a:solidFill>
+                  <a:srgbClr val="000000"/>
+                </a:solidFill>
+                <a:latin typeface="Open Sans Bold"/>
+                <a:ea typeface="Open Sans Bold"/>
+                <a:cs typeface="Open Sans Bold"/>
+                <a:sym typeface="Open Sans Bold"/>
+              </a:rPr>
+              <a:t>separador de fuentes</a:t>
+            </a:r>
+            <a:r>
+              <a:rPr lang="en-US" sz="3399">
+                <a:solidFill>
+                  <a:srgbClr val="000000"/>
+                </a:solidFill>
+                <a:latin typeface="Open Sans"/>
+                <a:ea typeface="Open Sans"/>
+                <a:cs typeface="Open Sans"/>
+                <a:sym typeface="Open Sans"/>
+              </a:rPr>
+              <a:t>. Es agnóstico al tipo de UI o de sistema en el que esté corriendo la aplicación. Especialmente util para la portabilidad que busca el sistema. Carga, ejecuta y descarga las tareas.</a:t>
             </a:r>
           </a:p>
           <a:p>
@@ -3639,7 +3794,7 @@
         </p:nvSpPr>
         <p:spPr>
           <a:xfrm>
-            <a:off x="7469639" y="537527"/>
+            <a:off x="7469639" y="141605"/>
             <a:ext cx="3348722" cy="887095"/>
           </a:xfrm>
           <a:prstGeom prst="rect">
@@ -3680,8 +3835,8 @@
         </p:nvSpPr>
         <p:spPr>
           <a:xfrm>
-            <a:off x="1028700" y="1357948"/>
-            <a:ext cx="16230600" cy="7181215"/>
+            <a:off x="1028700" y="1315031"/>
+            <a:ext cx="16230600" cy="8381365"/>
           </a:xfrm>
           <a:prstGeom prst="rect">
             <a:avLst/>
@@ -3692,41 +3847,6 @@
             <a:spAutoFit/>
           </a:bodyPr>
           <a:lstStyle/>
-          <a:p>
-            <a:pPr algn="just">
-              <a:lnSpc>
-                <a:spcPts val="4759"/>
-              </a:lnSpc>
-            </a:pPr>
-            <a:r>
-              <a:rPr lang="en-US" sz="3399" b="1">
-                <a:solidFill>
-                  <a:srgbClr val="000000"/>
-                </a:solidFill>
-                <a:latin typeface="Open Sans Bold"/>
-                <a:ea typeface="Open Sans Bold"/>
-                <a:cs typeface="Open Sans Bold"/>
-                <a:sym typeface="Open Sans Bold"/>
-              </a:rPr>
-              <a:t>Aplicación:</a:t>
-            </a:r>
-          </a:p>
-          <a:p>
-            <a:pPr algn="just">
-              <a:lnSpc>
-                <a:spcPts val="4759"/>
-              </a:lnSpc>
-            </a:pPr>
-            <a:endParaRPr lang="en-US" sz="3399" b="1">
-              <a:solidFill>
-                <a:srgbClr val="000000"/>
-              </a:solidFill>
-              <a:latin typeface="Open Sans Bold"/>
-              <a:ea typeface="Open Sans Bold"/>
-              <a:cs typeface="Open Sans Bold"/>
-              <a:sym typeface="Open Sans Bold"/>
-            </a:endParaRPr>
-          </a:p>
           <a:p>
             <a:pPr marL="734059" lvl="1" indent="-367030" algn="just">
               <a:lnSpc>
@@ -3745,7 +3865,7 @@
                 <a:cs typeface="Open Sans Bold"/>
                 <a:sym typeface="Open Sans Bold"/>
               </a:rPr>
-              <a:t>Coordinador de Separación: </a:t>
+              <a:t>Wrapper del modelo de separación: </a:t>
             </a:r>
             <a:r>
               <a:rPr lang="en-US" sz="3399">
@@ -3757,31 +3877,7 @@
                 <a:cs typeface="Open Sans"/>
                 <a:sym typeface="Open Sans"/>
               </a:rPr>
-              <a:t>Coordina la separación de fuentes desde la carga del archivo, la conversión automática si viene de una grabación por micrófono del dispositivo, y comunicar el archivo hacia el componente que contiene la lógica e interacción con el modelo (</a:t>
-            </a:r>
-            <a:r>
-              <a:rPr lang="en-US" sz="3399" b="1">
-                <a:solidFill>
-                  <a:srgbClr val="000000"/>
-                </a:solidFill>
-                <a:latin typeface="Open Sans Bold"/>
-                <a:ea typeface="Open Sans Bold"/>
-                <a:cs typeface="Open Sans Bold"/>
-                <a:sym typeface="Open Sans Bold"/>
-              </a:rPr>
-              <a:t>Separador de Fuentes</a:t>
-            </a:r>
-            <a:r>
-              <a:rPr lang="en-US" sz="3399">
-                <a:solidFill>
-                  <a:srgbClr val="000000"/>
-                </a:solidFill>
-                <a:latin typeface="Open Sans"/>
-                <a:ea typeface="Open Sans"/>
-                <a:cs typeface="Open Sans"/>
-                <a:sym typeface="Open Sans"/>
-              </a:rPr>
-              <a:t>).</a:t>
+              <a:t>Este expone la lógica del modelo, así también hace uso de paquetes internos para gestionar el procesamiento final de la separación de pistas del archivo de audio que se cargue.</a:t>
             </a:r>
           </a:p>
           <a:p>
@@ -3802,7 +3898,7 @@
                 <a:cs typeface="Open Sans Bold"/>
                 <a:sym typeface="Open Sans Bold"/>
               </a:rPr>
-              <a:t>Exportador de Pistas:</a:t>
+              <a:t>Gestor de almacenamiento:</a:t>
             </a:r>
             <a:r>
               <a:rPr lang="en-US" sz="3399">
@@ -3814,7 +3910,7 @@
                 <a:cs typeface="Open Sans"/>
                 <a:sym typeface="Open Sans"/>
               </a:rPr>
-              <a:t> Gestiona la exportación de pistas editadas.</a:t>
+              <a:t> Se encarga de conectar con el almacenamiento asignado al sistema. Es decir, si es local, se encarga de este sistema de archivos.</a:t>
             </a:r>
           </a:p>
           <a:p>
@@ -3835,7 +3931,7 @@
                 <a:cs typeface="Open Sans Bold"/>
                 <a:sym typeface="Open Sans Bold"/>
               </a:rPr>
-              <a:t>Editor de Pistas:</a:t>
+              <a:t>Manejador</a:t>
             </a:r>
             <a:r>
               <a:rPr lang="en-US" sz="3399">
@@ -3847,7 +3943,7 @@
                 <a:cs typeface="Open Sans"/>
                 <a:sym typeface="Open Sans"/>
               </a:rPr>
-              <a:t> Recibe las modificaciones aplicadas por el usuario y las comunica al servicio que se encargará de saber aplicar las modificaciones (</a:t>
+              <a:t> </a:t>
             </a:r>
             <a:r>
               <a:rPr lang="en-US" sz="3399" b="1">
@@ -3859,7 +3955,7 @@
                 <a:cs typeface="Open Sans Bold"/>
                 <a:sym typeface="Open Sans Bold"/>
               </a:rPr>
-              <a:t>Editor de Propiedades de Audio</a:t>
+              <a:t>de Sesión</a:t>
             </a:r>
             <a:r>
               <a:rPr lang="en-US" sz="3399">
@@ -3871,7 +3967,7 @@
                 <a:cs typeface="Open Sans"/>
                 <a:sym typeface="Open Sans"/>
               </a:rPr>
-              <a:t>).</a:t>
+              <a:t>: Componente invocado para poder detectar cambios en las pistas a la hora de editarlas o realizar alguna acción una vez el usuario se encuentre en el apartado de edición como guardar, exportar y salir sin guardar.</a:t>
             </a:r>
           </a:p>
           <a:p>
@@ -3892,7 +3988,7 @@
                 <a:cs typeface="Open Sans Bold"/>
                 <a:sym typeface="Open Sans Bold"/>
               </a:rPr>
-              <a:t>Historial</a:t>
+              <a:t>Capturador de Audio:  </a:t>
             </a:r>
             <a:r>
               <a:rPr lang="en-US" sz="3399">
@@ -3904,7 +4000,7 @@
                 <a:cs typeface="Open Sans"/>
                 <a:sym typeface="Open Sans"/>
               </a:rPr>
-              <a:t>: Administra la consulta y recuperación del historial.</a:t>
+              <a:t>Hace uso del micrófono interno del sistema para procesar el audio. Es un componente creado como respuesta a las opciones que tiene el usuario para cargar un archivo.</a:t>
             </a:r>
           </a:p>
           <a:p>
@@ -4000,7 +4096,7 @@
         <p:spPr>
           <a:xfrm>
             <a:off x="1028700" y="1357948"/>
-            <a:ext cx="16230600" cy="8981440"/>
+            <a:ext cx="16230600" cy="8381365"/>
           </a:xfrm>
           <a:prstGeom prst="rect">
             <a:avLst/>
@@ -4017,34 +4113,7 @@
                 <a:spcPts val="4759"/>
               </a:lnSpc>
             </a:pPr>
-            <a:r>
-              <a:rPr lang="en-US" sz="3399" b="1">
-                <a:solidFill>
-                  <a:srgbClr val="000000"/>
-                </a:solidFill>
-                <a:latin typeface="Open Sans Bold"/>
-                <a:ea typeface="Open Sans Bold"/>
-                <a:cs typeface="Open Sans Bold"/>
-                <a:sym typeface="Open Sans Bold"/>
-              </a:rPr>
-              <a:t>Lógica:</a:t>
-            </a:r>
-          </a:p>
-          <a:p>
-            <a:pPr algn="just">
-              <a:lnSpc>
-                <a:spcPts val="4759"/>
-              </a:lnSpc>
-            </a:pPr>
-            <a:endParaRPr lang="en-US" sz="3399" b="1">
-              <a:solidFill>
-                <a:srgbClr val="000000"/>
-              </a:solidFill>
-              <a:latin typeface="Open Sans Bold"/>
-              <a:ea typeface="Open Sans Bold"/>
-              <a:cs typeface="Open Sans Bold"/>
-              <a:sym typeface="Open Sans Bold"/>
-            </a:endParaRPr>
+            <a:endParaRPr/>
           </a:p>
           <a:p>
             <a:pPr marL="734059" lvl="1" indent="-367030" algn="just">
@@ -4064,7 +4133,7 @@
                 <a:cs typeface="Open Sans Bold"/>
                 <a:sym typeface="Open Sans Bold"/>
               </a:rPr>
-              <a:t>Separador de Audio: </a:t>
+              <a:t>Procesador de Audio: </a:t>
             </a:r>
             <a:r>
               <a:rPr lang="en-US" sz="3399">
@@ -4076,7 +4145,7 @@
                 <a:cs typeface="Open Sans"/>
                 <a:sym typeface="Open Sans"/>
               </a:rPr>
-              <a:t>Implementa el modelo de IA para separar pistas y preprocesamiento de ser necesario.</a:t>
+              <a:t>Contiene la lógica e implementación de cómo se modifican internamente las pistas para aplicar modificaciones como volumen o efectos básicos.</a:t>
             </a:r>
           </a:p>
           <a:p>
@@ -4097,7 +4166,7 @@
                 <a:cs typeface="Open Sans Bold"/>
                 <a:sym typeface="Open Sans Bold"/>
               </a:rPr>
-              <a:t>Validador de Archivos: </a:t>
+              <a:t>Editor de audio</a:t>
             </a:r>
             <a:r>
               <a:rPr lang="en-US" sz="3399">
@@ -4109,7 +4178,55 @@
                 <a:cs typeface="Open Sans"/>
                 <a:sym typeface="Open Sans"/>
               </a:rPr>
-              <a:t>Verifica formatos del audio de entrada.</a:t>
+              <a:t>: Procesa los datos entregados que desea aplicar el usuario, así también como la ubicación temporal de estos en el sistema para ser enviados al </a:t>
+            </a:r>
+            <a:r>
+              <a:rPr lang="en-US" sz="3399" b="1">
+                <a:solidFill>
+                  <a:srgbClr val="000000"/>
+                </a:solidFill>
+                <a:latin typeface="Open Sans Bold"/>
+                <a:ea typeface="Open Sans Bold"/>
+                <a:cs typeface="Open Sans Bold"/>
+                <a:sym typeface="Open Sans Bold"/>
+              </a:rPr>
+              <a:t>procesador de audio</a:t>
+            </a:r>
+            <a:r>
+              <a:rPr lang="en-US" sz="3399">
+                <a:solidFill>
+                  <a:srgbClr val="000000"/>
+                </a:solidFill>
+                <a:latin typeface="Open Sans"/>
+                <a:ea typeface="Open Sans"/>
+                <a:cs typeface="Open Sans"/>
+                <a:sym typeface="Open Sans"/>
+              </a:rPr>
+              <a:t>. Al igual implementa </a:t>
+            </a:r>
+            <a:r>
+              <a:rPr lang="en-US" sz="3399" b="1">
+                <a:solidFill>
+                  <a:srgbClr val="000000"/>
+                </a:solidFill>
+                <a:latin typeface="Open Sans Bold"/>
+                <a:ea typeface="Open Sans Bold"/>
+                <a:cs typeface="Open Sans Bold"/>
+                <a:sym typeface="Open Sans Bold"/>
+              </a:rPr>
+              <a:t>manejo de sesión </a:t>
+            </a:r>
+            <a:r>
+              <a:rPr lang="en-US" sz="3399">
+                <a:solidFill>
+                  <a:srgbClr val="000000"/>
+                </a:solidFill>
+                <a:latin typeface="Open Sans"/>
+                <a:ea typeface="Open Sans"/>
+                <a:cs typeface="Open Sans"/>
+                <a:sym typeface="Open Sans"/>
+              </a:rPr>
+              <a:t>para aplicar los cambios sobre estos de ser necesario, incluso el almacenamiento.</a:t>
             </a:r>
           </a:p>
           <a:p>
@@ -4130,7 +4247,7 @@
                 <a:cs typeface="Open Sans Bold"/>
                 <a:sym typeface="Open Sans Bold"/>
               </a:rPr>
-              <a:t>Conversor de Formatos: </a:t>
+              <a:t>Validador de Archivos:</a:t>
             </a:r>
             <a:r>
               <a:rPr lang="en-US" sz="3399">
@@ -4142,7 +4259,7 @@
                 <a:cs typeface="Open Sans"/>
                 <a:sym typeface="Open Sans"/>
               </a:rPr>
-              <a:t>Convierte archivos a formatos compatibles.</a:t>
+              <a:t> Implementa la validación de integridad y formato del archivo que se está cargando a procesar.</a:t>
             </a:r>
           </a:p>
           <a:p>
@@ -4163,7 +4280,7 @@
                 <a:cs typeface="Open Sans Bold"/>
                 <a:sym typeface="Open Sans Bold"/>
               </a:rPr>
-              <a:t>Grabador de Audio: </a:t>
+              <a:t>Grabador de Micrófono: </a:t>
             </a:r>
             <a:r>
               <a:rPr lang="en-US" sz="3399">
@@ -4175,106 +4292,7 @@
                 <a:cs typeface="Open Sans"/>
                 <a:sym typeface="Open Sans"/>
               </a:rPr>
-              <a:t>Procesa la grabación desde el micrófono.</a:t>
-            </a:r>
-          </a:p>
-          <a:p>
-            <a:pPr marL="734059" lvl="1" indent="-367030" algn="just">
-              <a:lnSpc>
-                <a:spcPts val="4759"/>
-              </a:lnSpc>
-              <a:buFont typeface="Arial"/>
-              <a:buChar char="•"/>
-            </a:pPr>
-            <a:r>
-              <a:rPr lang="en-US" sz="3399" b="1">
-                <a:solidFill>
-                  <a:srgbClr val="000000"/>
-                </a:solidFill>
-                <a:latin typeface="Open Sans Bold"/>
-                <a:ea typeface="Open Sans Bold"/>
-                <a:cs typeface="Open Sans Bold"/>
-                <a:sym typeface="Open Sans Bold"/>
-              </a:rPr>
-              <a:t>Editor de Propiedades de Audio: </a:t>
-            </a:r>
-            <a:r>
-              <a:rPr lang="en-US" sz="3399">
-                <a:solidFill>
-                  <a:srgbClr val="000000"/>
-                </a:solidFill>
-                <a:latin typeface="Open Sans"/>
-                <a:ea typeface="Open Sans"/>
-                <a:cs typeface="Open Sans"/>
-                <a:sym typeface="Open Sans"/>
-              </a:rPr>
-              <a:t>Aplica efectos y ajustes básicos a la(s) pista(s) seleccionada(s).</a:t>
-            </a:r>
-          </a:p>
-          <a:p>
-            <a:pPr marL="734059" lvl="1" indent="-367030" algn="just">
-              <a:lnSpc>
-                <a:spcPts val="4759"/>
-              </a:lnSpc>
-              <a:buFont typeface="Arial"/>
-              <a:buChar char="•"/>
-            </a:pPr>
-            <a:r>
-              <a:rPr lang="en-US" sz="3399" b="1">
-                <a:solidFill>
-                  <a:srgbClr val="000000"/>
-                </a:solidFill>
-                <a:latin typeface="Open Sans Bold"/>
-                <a:ea typeface="Open Sans Bold"/>
-                <a:cs typeface="Open Sans Bold"/>
-                <a:sym typeface="Open Sans Bold"/>
-              </a:rPr>
-              <a:t>Historial</a:t>
-            </a:r>
-            <a:r>
-              <a:rPr lang="en-US" sz="3399">
-                <a:solidFill>
-                  <a:srgbClr val="000000"/>
-                </a:solidFill>
-                <a:latin typeface="Open Sans"/>
-                <a:ea typeface="Open Sans"/>
-                <a:cs typeface="Open Sans"/>
-                <a:sym typeface="Open Sans"/>
-              </a:rPr>
-              <a:t>: Lógica para almacenar y recuperar acciones del almacenamiento local.</a:t>
-            </a:r>
-          </a:p>
-          <a:p>
-            <a:pPr marL="734059" lvl="1" indent="-367030" algn="just">
-              <a:lnSpc>
-                <a:spcPts val="4759"/>
-              </a:lnSpc>
-              <a:buFont typeface="Arial"/>
-              <a:buChar char="•"/>
-            </a:pPr>
-            <a:r>
-              <a:rPr lang="en-US" sz="3399" b="1">
-                <a:solidFill>
-                  <a:srgbClr val="000000"/>
-                </a:solidFill>
-                <a:latin typeface="Open Sans Bold"/>
-                <a:ea typeface="Open Sans Bold"/>
-                <a:cs typeface="Open Sans Bold"/>
-                <a:sym typeface="Open Sans Bold"/>
-              </a:rPr>
-              <a:t>Manejo de Sesión:</a:t>
-            </a:r>
-            <a:r>
-              <a:rPr lang="en-US" sz="3399">
-                <a:solidFill>
-                  <a:srgbClr val="000000"/>
-                </a:solidFill>
-                <a:latin typeface="Open Sans"/>
-                <a:ea typeface="Open Sans"/>
-                <a:cs typeface="Open Sans"/>
-                <a:sym typeface="Open Sans"/>
-              </a:rPr>
-              <a:t> Se encarga de gestionar los cambios en el conjunto de pistas que se encuentran en edición. Es usado por procesos que guardan cambios o interactúan con las que se almacenan temporalmente.</a:t>
+              <a:t>Hace uso del capturador de audio por micrófono y el acceso al almacenamiento.</a:t>
             </a:r>
           </a:p>
           <a:p>
@@ -4328,8 +4346,8 @@
         </p:nvSpPr>
         <p:spPr>
           <a:xfrm>
-            <a:off x="7609463" y="537527"/>
-            <a:ext cx="3069074" cy="887095"/>
+            <a:off x="1028700" y="1819592"/>
+            <a:ext cx="16230600" cy="6581140"/>
           </a:xfrm>
           <a:prstGeom prst="rect">
             <a:avLst/>
@@ -4341,80 +4359,12 @@
           </a:bodyPr>
           <a:lstStyle/>
           <a:p>
-            <a:pPr algn="ctr">
-              <a:lnSpc>
-                <a:spcPts val="7279"/>
-              </a:lnSpc>
-            </a:pPr>
-            <a:r>
-              <a:rPr lang="en-US" sz="5199" b="1">
-                <a:solidFill>
-                  <a:srgbClr val="000000"/>
-                </a:solidFill>
-                <a:latin typeface="Open Sans Bold"/>
-                <a:ea typeface="Open Sans Bold"/>
-                <a:cs typeface="Open Sans Bold"/>
-                <a:sym typeface="Open Sans Bold"/>
-              </a:rPr>
-              <a:t>Catálogo </a:t>
-            </a:r>
-          </a:p>
-        </p:txBody>
-      </p:sp>
-      <p:sp>
-        <p:nvSpPr>
-          <p:cNvPr id="3" name="TextBox 3"/>
-          <p:cNvSpPr txBox="1"/>
-          <p:nvPr/>
-        </p:nvSpPr>
-        <p:spPr>
-          <a:xfrm>
-            <a:off x="1028700" y="1357948"/>
-            <a:ext cx="16230600" cy="4180840"/>
-          </a:xfrm>
-          <a:prstGeom prst="rect">
-            <a:avLst/>
-          </a:prstGeom>
-        </p:spPr>
-        <p:txBody>
-          <a:bodyPr lIns="0" tIns="0" rIns="0" bIns="0" rtlCol="0" anchor="t">
-            <a:spAutoFit/>
-          </a:bodyPr>
-          <a:lstStyle/>
-          <a:p>
             <a:pPr algn="just">
               <a:lnSpc>
                 <a:spcPts val="4759"/>
               </a:lnSpc>
             </a:pPr>
-            <a:r>
-              <a:rPr lang="en-US" sz="3399" b="1">
-                <a:solidFill>
-                  <a:srgbClr val="000000"/>
-                </a:solidFill>
-                <a:latin typeface="Open Sans Bold"/>
-                <a:ea typeface="Open Sans Bold"/>
-                <a:cs typeface="Open Sans Bold"/>
-                <a:sym typeface="Open Sans Bold"/>
-              </a:rPr>
-              <a:t>Infraestructura:</a:t>
-            </a:r>
-          </a:p>
-          <a:p>
-            <a:pPr algn="just">
-              <a:lnSpc>
-                <a:spcPts val="4759"/>
-              </a:lnSpc>
-            </a:pPr>
-            <a:endParaRPr lang="en-US" sz="3399" b="1">
-              <a:solidFill>
-                <a:srgbClr val="000000"/>
-              </a:solidFill>
-              <a:latin typeface="Open Sans Bold"/>
-              <a:ea typeface="Open Sans Bold"/>
-              <a:cs typeface="Open Sans Bold"/>
-              <a:sym typeface="Open Sans Bold"/>
-            </a:endParaRPr>
+            <a:endParaRPr/>
           </a:p>
           <a:p>
             <a:pPr marL="734059" lvl="1" indent="-367030" algn="just">
@@ -4434,7 +4384,7 @@
                 <a:cs typeface="Open Sans Bold"/>
                 <a:sym typeface="Open Sans Bold"/>
               </a:rPr>
-              <a:t>Sistema de Captura de Micrófono: </a:t>
+              <a:t>Convertidor de Archivos:</a:t>
             </a:r>
             <a:r>
               <a:rPr lang="en-US" sz="3399">
@@ -4446,7 +4396,7 @@
                 <a:cs typeface="Open Sans"/>
                 <a:sym typeface="Open Sans"/>
               </a:rPr>
-              <a:t>Driver y permisos para acceder al hardware del micrófono.</a:t>
+              <a:t> Se encarga de implementar la conversión automática en caso de ser grabado por micrófono o durante la exportación de una serie de pistas o una pista seleccionada.</a:t>
             </a:r>
           </a:p>
           <a:p>
@@ -4467,7 +4417,7 @@
                 <a:cs typeface="Open Sans Bold"/>
                 <a:sym typeface="Open Sans Bold"/>
               </a:rPr>
-              <a:t>Sistema Local de Archivos: </a:t>
+              <a:t>Gestor de Historial: </a:t>
             </a:r>
             <a:r>
               <a:rPr lang="en-US" sz="3399">
@@ -4479,7 +4429,160 @@
                 <a:cs typeface="Open Sans"/>
                 <a:sym typeface="Open Sans"/>
               </a:rPr>
-              <a:t>Almacenamiento y sistema de archivos del dispositivo donde se almacenan información local de la aplicación.</a:t>
+              <a:t>Se encarga de mantener un seguimiento a la sesión del usuario o los “proyectos” (sesiones de separación) que haya guardado. También implementa </a:t>
+            </a:r>
+            <a:r>
+              <a:rPr lang="en-US" sz="3399" b="1">
+                <a:solidFill>
+                  <a:srgbClr val="000000"/>
+                </a:solidFill>
+                <a:latin typeface="Open Sans Bold"/>
+                <a:ea typeface="Open Sans Bold"/>
+                <a:cs typeface="Open Sans Bold"/>
+                <a:sym typeface="Open Sans Bold"/>
+              </a:rPr>
+              <a:t>manejo de sesión </a:t>
+            </a:r>
+            <a:r>
+              <a:rPr lang="en-US" sz="3399">
+                <a:solidFill>
+                  <a:srgbClr val="000000"/>
+                </a:solidFill>
+                <a:latin typeface="Open Sans"/>
+                <a:ea typeface="Open Sans"/>
+                <a:cs typeface="Open Sans"/>
+                <a:sym typeface="Open Sans"/>
+              </a:rPr>
+              <a:t>y </a:t>
+            </a:r>
+            <a:r>
+              <a:rPr lang="en-US" sz="3399" b="1">
+                <a:solidFill>
+                  <a:srgbClr val="000000"/>
+                </a:solidFill>
+                <a:latin typeface="Open Sans Bold"/>
+                <a:ea typeface="Open Sans Bold"/>
+                <a:cs typeface="Open Sans Bold"/>
+                <a:sym typeface="Open Sans Bold"/>
+              </a:rPr>
+              <a:t>gestor de almacenamiento</a:t>
+            </a:r>
+            <a:r>
+              <a:rPr lang="en-US" sz="3399">
+                <a:solidFill>
+                  <a:srgbClr val="000000"/>
+                </a:solidFill>
+                <a:latin typeface="Open Sans"/>
+                <a:ea typeface="Open Sans"/>
+                <a:cs typeface="Open Sans"/>
+                <a:sym typeface="Open Sans"/>
+              </a:rPr>
+              <a:t>.</a:t>
+            </a:r>
+          </a:p>
+          <a:p>
+            <a:pPr marL="734059" lvl="1" indent="-367030" algn="just">
+              <a:lnSpc>
+                <a:spcPts val="4759"/>
+              </a:lnSpc>
+              <a:buFont typeface="Arial"/>
+              <a:buChar char="•"/>
+            </a:pPr>
+            <a:r>
+              <a:rPr lang="en-US" sz="3399" b="1">
+                <a:solidFill>
+                  <a:srgbClr val="000000"/>
+                </a:solidFill>
+                <a:latin typeface="Open Sans Bold"/>
+                <a:ea typeface="Open Sans Bold"/>
+                <a:cs typeface="Open Sans Bold"/>
+                <a:sym typeface="Open Sans Bold"/>
+              </a:rPr>
+              <a:t>Gestor de Carga de Archivo: </a:t>
+            </a:r>
+            <a:r>
+              <a:rPr lang="en-US" sz="3399">
+                <a:solidFill>
+                  <a:srgbClr val="000000"/>
+                </a:solidFill>
+                <a:latin typeface="Open Sans"/>
+                <a:ea typeface="Open Sans"/>
+                <a:cs typeface="Open Sans"/>
+                <a:sym typeface="Open Sans"/>
+              </a:rPr>
+              <a:t>Contiene la lógica para la carga del archivo. </a:t>
+            </a:r>
+            <a:r>
+              <a:rPr lang="en-US" sz="3399" b="1">
+                <a:solidFill>
+                  <a:srgbClr val="000000"/>
+                </a:solidFill>
+                <a:latin typeface="Open Sans Bold"/>
+                <a:ea typeface="Open Sans Bold"/>
+                <a:cs typeface="Open Sans Bold"/>
+                <a:sym typeface="Open Sans Bold"/>
+              </a:rPr>
+              <a:t> </a:t>
+            </a:r>
+            <a:r>
+              <a:rPr lang="en-US" sz="3399">
+                <a:solidFill>
+                  <a:srgbClr val="000000"/>
+                </a:solidFill>
+                <a:latin typeface="Open Sans"/>
+                <a:ea typeface="Open Sans"/>
+                <a:cs typeface="Open Sans"/>
+                <a:sym typeface="Open Sans"/>
+              </a:rPr>
+              <a:t> Es decir, la inicialización del proceso descrito en el diagrama de actividad. Trabaja de la mano con la </a:t>
+            </a:r>
+            <a:r>
+              <a:rPr lang="en-US" sz="3399" b="1">
+                <a:solidFill>
+                  <a:srgbClr val="000000"/>
+                </a:solidFill>
+                <a:latin typeface="Open Sans Bold"/>
+                <a:ea typeface="Open Sans Bold"/>
+                <a:cs typeface="Open Sans Bold"/>
+                <a:sym typeface="Open Sans Bold"/>
+              </a:rPr>
+              <a:t>validación </a:t>
+            </a:r>
+            <a:r>
+              <a:rPr lang="en-US" sz="3399">
+                <a:solidFill>
+                  <a:srgbClr val="000000"/>
+                </a:solidFill>
+                <a:latin typeface="Open Sans"/>
+                <a:ea typeface="Open Sans"/>
+                <a:cs typeface="Open Sans"/>
+                <a:sym typeface="Open Sans"/>
+              </a:rPr>
+              <a:t>y </a:t>
+            </a:r>
+            <a:r>
+              <a:rPr lang="en-US" sz="3399" b="1">
+                <a:solidFill>
+                  <a:srgbClr val="000000"/>
+                </a:solidFill>
+                <a:latin typeface="Open Sans Bold"/>
+                <a:ea typeface="Open Sans Bold"/>
+                <a:cs typeface="Open Sans Bold"/>
+                <a:sym typeface="Open Sans Bold"/>
+              </a:rPr>
+              <a:t>conversión</a:t>
+            </a:r>
+            <a:r>
+              <a:rPr lang="en-US" sz="3399">
+                <a:solidFill>
+                  <a:srgbClr val="000000"/>
+                </a:solidFill>
+                <a:latin typeface="Open Sans"/>
+                <a:ea typeface="Open Sans"/>
+                <a:cs typeface="Open Sans"/>
+                <a:sym typeface="Open Sans"/>
+              </a:rPr>
+              <a:t>.</a:t>
             </a:r>
           </a:p>
           <a:p>
@@ -4497,6 +4600,47 @@
               <a:cs typeface="Open Sans"/>
               <a:sym typeface="Open Sans"/>
             </a:endParaRPr>
+          </a:p>
+        </p:txBody>
+      </p:sp>
+      <p:sp>
+        <p:nvSpPr>
+          <p:cNvPr id="3" name="TextBox 3"/>
+          <p:cNvSpPr txBox="1"/>
+          <p:nvPr/>
+        </p:nvSpPr>
+        <p:spPr>
+          <a:xfrm>
+            <a:off x="7609463" y="537527"/>
+            <a:ext cx="3069074" cy="887095"/>
+          </a:xfrm>
+          <a:prstGeom prst="rect">
+            <a:avLst/>
+          </a:prstGeom>
+        </p:spPr>
+        <p:txBody>
+          <a:bodyPr lIns="0" tIns="0" rIns="0" bIns="0" rtlCol="0" anchor="t">
+            <a:spAutoFit/>
+          </a:bodyPr>
+          <a:lstStyle/>
+          <a:p>
+            <a:pPr algn="ctr">
+              <a:lnSpc>
+                <a:spcPts val="7279"/>
+              </a:lnSpc>
+            </a:pPr>
+            <a:r>
+              <a:rPr lang="en-US" sz="5199" b="1">
+                <a:solidFill>
+                  <a:srgbClr val="000000"/>
+                </a:solidFill>
+                <a:latin typeface="Open Sans Bold"/>
+                <a:ea typeface="Open Sans Bold"/>
+                <a:cs typeface="Open Sans Bold"/>
+                <a:sym typeface="Open Sans Bold"/>
+              </a:rPr>
+              <a:t>Catálogo </a:t>
+            </a:r>
           </a:p>
         </p:txBody>
       </p:sp>
@@ -4533,8 +4677,8 @@
         </p:nvSpPr>
         <p:spPr>
           <a:xfrm>
-            <a:off x="1315921" y="800100"/>
-            <a:ext cx="15656157" cy="9356394"/>
+            <a:off x="1412643" y="789001"/>
+            <a:ext cx="15462714" cy="9258300"/>
           </a:xfrm>
           <a:custGeom>
             <a:avLst/>
@@ -4645,8 +4789,8 @@
         </p:nvSpPr>
         <p:spPr>
           <a:xfrm>
-            <a:off x="6924198" y="571500"/>
-            <a:ext cx="4439603" cy="887095"/>
+            <a:off x="7114698" y="571500"/>
+            <a:ext cx="4058603" cy="887095"/>
           </a:xfrm>
           <a:prstGeom prst="rect">
             <a:avLst/>
@@ -4761,8 +4905,8 @@
         </p:nvSpPr>
         <p:spPr>
           <a:xfrm>
-            <a:off x="6323617" y="571500"/>
-            <a:ext cx="5640765" cy="887095"/>
+            <a:off x="6704617" y="571500"/>
+            <a:ext cx="4878765" cy="887095"/>
           </a:xfrm>
           <a:prstGeom prst="rect">
             <a:avLst/>
@@ -4973,6 +5117,650 @@
 </file>
 
 <file path=ppt/slides/slide18.xml><?xml version="1.0" encoding="utf-8"?>
+<p:sld xmlns:a="http://schemas.openxmlformats.org/drawingml/2006/main" xmlns:r="http://schemas.openxmlformats.org/officeDocument/2006/relationships" xmlns:p="http://schemas.openxmlformats.org/presentationml/2006/main">
+  <p:cSld>
+    <p:spTree>
+      <p:nvGrpSpPr>
+        <p:cNvPr id="1" name=""/>
+        <p:cNvGrpSpPr/>
+        <p:nvPr/>
+      </p:nvGrpSpPr>
+      <p:grpSpPr>
+        <a:xfrm>
+          <a:off x="0" y="0"/>
+          <a:ext cx="0" cy="0"/>
+          <a:chOff x="0" y="0"/>
+          <a:chExt cx="0" cy="0"/>
+        </a:xfrm>
+      </p:grpSpPr>
+      <p:sp>
+        <p:nvSpPr>
+          <p:cNvPr id="2" name="Freeform 2"/>
+          <p:cNvSpPr/>
+          <p:nvPr/>
+        </p:nvSpPr>
+        <p:spPr>
+          <a:xfrm>
+            <a:off x="1028700" y="1804496"/>
+            <a:ext cx="16230600" cy="6678008"/>
+          </a:xfrm>
+          <a:custGeom>
+            <a:avLst/>
+            <a:gdLst/>
+            <a:ahLst/>
+            <a:cxnLst/>
+            <a:rect l="l" t="t" r="r" b="b"/>
+            <a:pathLst>
+              <a:path w="16230600" h="6678008">
+                <a:moveTo>
+                  <a:pt x="0" y="0"/>
+                </a:moveTo>
+                <a:lnTo>
+                  <a:pt x="16230600" y="0"/>
+                </a:lnTo>
+                <a:lnTo>
+                  <a:pt x="16230600" y="6678008"/>
+                </a:lnTo>
+                <a:lnTo>
+                  <a:pt x="0" y="6678008"/>
+                </a:lnTo>
+                <a:lnTo>
+                  <a:pt x="0" y="0"/>
+                </a:lnTo>
+                <a:close/>
+              </a:path>
+            </a:pathLst>
+          </a:custGeom>
+          <a:blipFill>
+            <a:blip r:embed="rId2"/>
+            <a:stretch>
+              <a:fillRect t="-158215"/>
+            </a:stretch>
+          </a:blipFill>
+        </p:spPr>
+      </p:sp>
+      <p:sp>
+        <p:nvSpPr>
+          <p:cNvPr id="3" name="TextBox 3"/>
+          <p:cNvSpPr txBox="1"/>
+          <p:nvPr/>
+        </p:nvSpPr>
+        <p:spPr>
+          <a:xfrm>
+            <a:off x="5887538" y="141605"/>
+            <a:ext cx="6512924" cy="887095"/>
+          </a:xfrm>
+          <a:prstGeom prst="rect">
+            <a:avLst/>
+          </a:prstGeom>
+        </p:spPr>
+        <p:txBody>
+          <a:bodyPr lIns="0" tIns="0" rIns="0" bIns="0" rtlCol="0" anchor="t">
+            <a:spAutoFit/>
+          </a:bodyPr>
+          <a:lstStyle/>
+          <a:p>
+            <a:pPr algn="ctr">
+              <a:lnSpc>
+                <a:spcPts val="7279"/>
+              </a:lnSpc>
+            </a:pPr>
+            <a:r>
+              <a:rPr lang="en-US" sz="5199" b="1">
+                <a:solidFill>
+                  <a:srgbClr val="000000"/>
+                </a:solidFill>
+                <a:latin typeface="Open Sans Bold"/>
+                <a:ea typeface="Open Sans Bold"/>
+                <a:cs typeface="Open Sans Bold"/>
+                <a:sym typeface="Open Sans Bold"/>
+              </a:rPr>
+              <a:t>Vista de Procesos</a:t>
+            </a:r>
+          </a:p>
+        </p:txBody>
+      </p:sp>
+    </p:spTree>
+  </p:cSld>
+  <p:clrMapOvr>
+    <a:masterClrMapping/>
+  </p:clrMapOvr>
+</p:sld>
+</file>
+
+<file path=ppt/slides/slide19.xml><?xml version="1.0" encoding="utf-8"?>
+<p:sld xmlns:a="http://schemas.openxmlformats.org/drawingml/2006/main" xmlns:r="http://schemas.openxmlformats.org/officeDocument/2006/relationships" xmlns:p="http://schemas.openxmlformats.org/presentationml/2006/main">
+  <p:cSld>
+    <p:spTree>
+      <p:nvGrpSpPr>
+        <p:cNvPr id="1" name=""/>
+        <p:cNvGrpSpPr/>
+        <p:nvPr/>
+      </p:nvGrpSpPr>
+      <p:grpSpPr>
+        <a:xfrm>
+          <a:off x="0" y="0"/>
+          <a:ext cx="0" cy="0"/>
+          <a:chOff x="0" y="0"/>
+          <a:chExt cx="0" cy="0"/>
+        </a:xfrm>
+      </p:grpSpPr>
+      <p:sp>
+        <p:nvSpPr>
+          <p:cNvPr id="2" name="TextBox 2"/>
+          <p:cNvSpPr txBox="1"/>
+          <p:nvPr/>
+        </p:nvSpPr>
+        <p:spPr>
+          <a:xfrm>
+            <a:off x="6742717" y="571500"/>
+            <a:ext cx="4802565" cy="887095"/>
+          </a:xfrm>
+          <a:prstGeom prst="rect">
+            <a:avLst/>
+          </a:prstGeom>
+        </p:spPr>
+        <p:txBody>
+          <a:bodyPr wrap="square" lIns="0" tIns="0" rIns="0" bIns="0" rtlCol="0" anchor="t">
+            <a:spAutoFit/>
+          </a:bodyPr>
+          <a:lstStyle/>
+          <a:p>
+            <a:pPr algn="ctr">
+              <a:lnSpc>
+                <a:spcPts val="7279"/>
+              </a:lnSpc>
+            </a:pPr>
+            <a:r>
+              <a:rPr lang="en-US" sz="5199" b="1" dirty="0" err="1">
+                <a:solidFill>
+                  <a:srgbClr val="000000"/>
+                </a:solidFill>
+                <a:latin typeface="Open Sans Bold"/>
+                <a:ea typeface="Open Sans Bold"/>
+                <a:cs typeface="Open Sans Bold"/>
+                <a:sym typeface="Open Sans Bold"/>
+              </a:rPr>
+              <a:t>Sobre</a:t>
+            </a:r>
+            <a:r>
+              <a:rPr lang="en-US" sz="5199" b="1" dirty="0">
+                <a:solidFill>
+                  <a:srgbClr val="000000"/>
+                </a:solidFill>
+                <a:latin typeface="Open Sans Bold"/>
+                <a:ea typeface="Open Sans Bold"/>
+                <a:cs typeface="Open Sans Bold"/>
+                <a:sym typeface="Open Sans Bold"/>
+              </a:rPr>
+              <a:t> </a:t>
+            </a:r>
+            <a:r>
+              <a:rPr lang="en-US" sz="5199" b="1" dirty="0" err="1">
+                <a:solidFill>
+                  <a:srgbClr val="000000"/>
+                </a:solidFill>
+                <a:latin typeface="Open Sans Bold"/>
+                <a:ea typeface="Open Sans Bold"/>
+                <a:cs typeface="Open Sans Bold"/>
+                <a:sym typeface="Open Sans Bold"/>
+              </a:rPr>
+              <a:t>el</a:t>
+            </a:r>
+            <a:r>
+              <a:rPr lang="en-US" sz="5199" b="1" dirty="0">
+                <a:solidFill>
+                  <a:srgbClr val="000000"/>
+                </a:solidFill>
+                <a:latin typeface="Open Sans Bold"/>
+                <a:ea typeface="Open Sans Bold"/>
+                <a:cs typeface="Open Sans Bold"/>
+                <a:sym typeface="Open Sans Bold"/>
+              </a:rPr>
+              <a:t> </a:t>
+            </a:r>
+            <a:r>
+              <a:rPr lang="en-US" sz="5199" b="1" dirty="0" err="1">
+                <a:solidFill>
+                  <a:srgbClr val="000000"/>
+                </a:solidFill>
+                <a:latin typeface="Open Sans Bold"/>
+                <a:ea typeface="Open Sans Bold"/>
+                <a:cs typeface="Open Sans Bold"/>
+                <a:sym typeface="Open Sans Bold"/>
+              </a:rPr>
+              <a:t>Flujo</a:t>
+            </a:r>
+            <a:endParaRPr lang="en-US" sz="5199" b="1" dirty="0">
+              <a:solidFill>
+                <a:srgbClr val="000000"/>
+              </a:solidFill>
+              <a:latin typeface="Open Sans Bold"/>
+              <a:ea typeface="Open Sans Bold"/>
+              <a:cs typeface="Open Sans Bold"/>
+              <a:sym typeface="Open Sans Bold"/>
+            </a:endParaRPr>
+          </a:p>
+        </p:txBody>
+      </p:sp>
+      <p:sp>
+        <p:nvSpPr>
+          <p:cNvPr id="3" name="TextBox 3"/>
+          <p:cNvSpPr txBox="1"/>
+          <p:nvPr/>
+        </p:nvSpPr>
+        <p:spPr>
+          <a:xfrm>
+            <a:off x="1028700" y="2419667"/>
+            <a:ext cx="16230600" cy="5380990"/>
+          </a:xfrm>
+          <a:prstGeom prst="rect">
+            <a:avLst/>
+          </a:prstGeom>
+        </p:spPr>
+        <p:txBody>
+          <a:bodyPr lIns="0" tIns="0" rIns="0" bIns="0" rtlCol="0" anchor="t">
+            <a:spAutoFit/>
+          </a:bodyPr>
+          <a:lstStyle/>
+          <a:p>
+            <a:pPr algn="just">
+              <a:lnSpc>
+                <a:spcPts val="4759"/>
+              </a:lnSpc>
+            </a:pPr>
+            <a:r>
+              <a:rPr lang="en-US" sz="3399">
+                <a:solidFill>
+                  <a:srgbClr val="000000"/>
+                </a:solidFill>
+                <a:latin typeface="Open Sans"/>
+                <a:ea typeface="Open Sans"/>
+                <a:cs typeface="Open Sans"/>
+                <a:sym typeface="Open Sans"/>
+              </a:rPr>
+              <a:t>Este diagrama representa la interacción de los componentes sobre la secuencia al momento de haber elegido grabar desde el micrófono en vez de subir el archivo del almacenamiento. Acá se compacta la definición de quien </a:t>
+            </a:r>
+            <a:r>
+              <a:rPr lang="en-US" sz="3399" b="1">
+                <a:solidFill>
+                  <a:srgbClr val="000000"/>
+                </a:solidFill>
+                <a:latin typeface="Open Sans Bold"/>
+                <a:ea typeface="Open Sans Bold"/>
+                <a:cs typeface="Open Sans Bold"/>
+                <a:sym typeface="Open Sans Bold"/>
+              </a:rPr>
+              <a:t>orquesta </a:t>
+            </a:r>
+            <a:r>
+              <a:rPr lang="en-US" sz="3399">
+                <a:solidFill>
+                  <a:srgbClr val="000000"/>
+                </a:solidFill>
+                <a:latin typeface="Open Sans"/>
+                <a:ea typeface="Open Sans"/>
+                <a:cs typeface="Open Sans"/>
+                <a:sym typeface="Open Sans"/>
+              </a:rPr>
+              <a:t>estos plugins. El componente de</a:t>
+            </a:r>
+            <a:r>
+              <a:rPr lang="en-US" sz="3399" b="1">
+                <a:solidFill>
+                  <a:srgbClr val="000000"/>
+                </a:solidFill>
+                <a:latin typeface="Open Sans Bold"/>
+                <a:ea typeface="Open Sans Bold"/>
+                <a:cs typeface="Open Sans Bold"/>
+                <a:sym typeface="Open Sans Bold"/>
+              </a:rPr>
+              <a:t> grabación del audio</a:t>
+            </a:r>
+            <a:r>
+              <a:rPr lang="en-US" sz="3399">
+                <a:solidFill>
+                  <a:srgbClr val="000000"/>
+                </a:solidFill>
+                <a:latin typeface="Open Sans"/>
+                <a:ea typeface="Open Sans"/>
+                <a:cs typeface="Open Sans"/>
+                <a:sym typeface="Open Sans"/>
+              </a:rPr>
+              <a:t> internamente hace uso la conexión hacia la </a:t>
+            </a:r>
+            <a:r>
+              <a:rPr lang="en-US" sz="3399" b="1">
+                <a:solidFill>
+                  <a:srgbClr val="000000"/>
+                </a:solidFill>
+                <a:latin typeface="Open Sans Bold"/>
+                <a:ea typeface="Open Sans Bold"/>
+                <a:cs typeface="Open Sans Bold"/>
+                <a:sym typeface="Open Sans Bold"/>
+              </a:rPr>
+              <a:t>captura de audio</a:t>
+            </a:r>
+            <a:r>
+              <a:rPr lang="en-US" sz="3399">
+                <a:solidFill>
+                  <a:srgbClr val="000000"/>
+                </a:solidFill>
+                <a:latin typeface="Open Sans"/>
+                <a:ea typeface="Open Sans"/>
+                <a:cs typeface="Open Sans"/>
+                <a:sym typeface="Open Sans"/>
+              </a:rPr>
+              <a:t> por medio del micrófono del sistema. Posterior, el que se encarga de la subida del archivo (</a:t>
+            </a:r>
+            <a:r>
+              <a:rPr lang="en-US" sz="3399" b="1">
+                <a:solidFill>
+                  <a:srgbClr val="000000"/>
+                </a:solidFill>
+                <a:latin typeface="Open Sans Bold"/>
+                <a:ea typeface="Open Sans Bold"/>
+                <a:cs typeface="Open Sans Bold"/>
+                <a:sym typeface="Open Sans Bold"/>
+              </a:rPr>
+              <a:t>inicialización</a:t>
+            </a:r>
+            <a:r>
+              <a:rPr lang="en-US" sz="3399">
+                <a:solidFill>
+                  <a:srgbClr val="000000"/>
+                </a:solidFill>
+                <a:latin typeface="Open Sans"/>
+                <a:ea typeface="Open Sans"/>
+                <a:cs typeface="Open Sans"/>
+                <a:sym typeface="Open Sans"/>
+              </a:rPr>
+              <a:t>), procede a recibir este para </a:t>
+            </a:r>
+            <a:r>
+              <a:rPr lang="en-US" sz="3399" b="1">
+                <a:solidFill>
+                  <a:srgbClr val="000000"/>
+                </a:solidFill>
+                <a:latin typeface="Open Sans Bold"/>
+                <a:ea typeface="Open Sans Bold"/>
+                <a:cs typeface="Open Sans Bold"/>
+                <a:sym typeface="Open Sans Bold"/>
+              </a:rPr>
+              <a:t>validarlo </a:t>
+            </a:r>
+            <a:r>
+              <a:rPr lang="en-US" sz="3399">
+                <a:solidFill>
+                  <a:srgbClr val="000000"/>
+                </a:solidFill>
+                <a:latin typeface="Open Sans"/>
+                <a:ea typeface="Open Sans"/>
+                <a:cs typeface="Open Sans"/>
+                <a:sym typeface="Open Sans"/>
+              </a:rPr>
+              <a:t>y </a:t>
+            </a:r>
+            <a:r>
+              <a:rPr lang="en-US" sz="3399" b="1">
+                <a:solidFill>
+                  <a:srgbClr val="000000"/>
+                </a:solidFill>
+                <a:latin typeface="Open Sans Bold"/>
+                <a:ea typeface="Open Sans Bold"/>
+                <a:cs typeface="Open Sans Bold"/>
+                <a:sym typeface="Open Sans Bold"/>
+              </a:rPr>
+              <a:t>convertirlo </a:t>
+            </a:r>
+            <a:r>
+              <a:rPr lang="en-US" sz="3399">
+                <a:solidFill>
+                  <a:srgbClr val="000000"/>
+                </a:solidFill>
+                <a:latin typeface="Open Sans"/>
+                <a:ea typeface="Open Sans"/>
+                <a:cs typeface="Open Sans"/>
+                <a:sym typeface="Open Sans"/>
+              </a:rPr>
+              <a:t>para ser tratado en el separador para un próximo paso.</a:t>
+            </a:r>
+          </a:p>
+          <a:p>
+            <a:pPr algn="just">
+              <a:lnSpc>
+                <a:spcPts val="4759"/>
+              </a:lnSpc>
+            </a:pPr>
+            <a:endParaRPr lang="en-US" sz="3399">
+              <a:solidFill>
+                <a:srgbClr val="000000"/>
+              </a:solidFill>
+              <a:latin typeface="Open Sans"/>
+              <a:ea typeface="Open Sans"/>
+              <a:cs typeface="Open Sans"/>
+              <a:sym typeface="Open Sans"/>
+            </a:endParaRPr>
+          </a:p>
+        </p:txBody>
+      </p:sp>
+    </p:spTree>
+  </p:cSld>
+  <p:clrMapOvr>
+    <a:masterClrMapping/>
+  </p:clrMapOvr>
+</p:sld>
+</file>
+
+<file path=ppt/slides/slide2.xml><?xml version="1.0" encoding="utf-8"?>
+<p:sld xmlns:a="http://schemas.openxmlformats.org/drawingml/2006/main" xmlns:r="http://schemas.openxmlformats.org/officeDocument/2006/relationships" xmlns:p="http://schemas.openxmlformats.org/presentationml/2006/main">
+  <p:cSld>
+    <p:spTree>
+      <p:nvGrpSpPr>
+        <p:cNvPr id="1" name=""/>
+        <p:cNvGrpSpPr/>
+        <p:nvPr/>
+      </p:nvGrpSpPr>
+      <p:grpSpPr>
+        <a:xfrm>
+          <a:off x="0" y="0"/>
+          <a:ext cx="0" cy="0"/>
+          <a:chOff x="0" y="0"/>
+          <a:chExt cx="0" cy="0"/>
+        </a:xfrm>
+      </p:grpSpPr>
+      <p:sp>
+        <p:nvSpPr>
+          <p:cNvPr id="2" name="TextBox 2"/>
+          <p:cNvSpPr txBox="1"/>
+          <p:nvPr/>
+        </p:nvSpPr>
+        <p:spPr>
+          <a:xfrm>
+            <a:off x="4424429" y="3619817"/>
+            <a:ext cx="9439141" cy="3580765"/>
+          </a:xfrm>
+          <a:prstGeom prst="rect">
+            <a:avLst/>
+          </a:prstGeom>
+        </p:spPr>
+        <p:txBody>
+          <a:bodyPr lIns="0" tIns="0" rIns="0" bIns="0" rtlCol="0" anchor="t">
+            <a:spAutoFit/>
+          </a:bodyPr>
+          <a:lstStyle/>
+          <a:p>
+            <a:pPr marL="734059" lvl="1" indent="-367030" algn="ctr">
+              <a:lnSpc>
+                <a:spcPts val="4759"/>
+              </a:lnSpc>
+              <a:buAutoNum type="arabicPeriod"/>
+            </a:pPr>
+            <a:r>
+              <a:rPr lang="en-US" sz="3399">
+                <a:solidFill>
+                  <a:srgbClr val="000000"/>
+                </a:solidFill>
+                <a:latin typeface="Open Sans"/>
+                <a:ea typeface="Open Sans"/>
+                <a:cs typeface="Open Sans"/>
+                <a:sym typeface="Open Sans"/>
+              </a:rPr>
+              <a:t>Vista Lógica</a:t>
+            </a:r>
+          </a:p>
+          <a:p>
+            <a:pPr marL="734059" lvl="1" indent="-367030" algn="ctr">
+              <a:lnSpc>
+                <a:spcPts val="4759"/>
+              </a:lnSpc>
+              <a:buAutoNum type="arabicPeriod"/>
+            </a:pPr>
+            <a:r>
+              <a:rPr lang="en-US" sz="3399">
+                <a:solidFill>
+                  <a:srgbClr val="000000"/>
+                </a:solidFill>
+                <a:latin typeface="Open Sans"/>
+                <a:ea typeface="Open Sans"/>
+                <a:cs typeface="Open Sans"/>
+                <a:sym typeface="Open Sans"/>
+              </a:rPr>
+              <a:t>Vista de Componentes</a:t>
+            </a:r>
+          </a:p>
+          <a:p>
+            <a:pPr marL="734059" lvl="1" indent="-367030" algn="ctr">
+              <a:lnSpc>
+                <a:spcPts val="4759"/>
+              </a:lnSpc>
+              <a:buAutoNum type="arabicPeriod"/>
+            </a:pPr>
+            <a:r>
+              <a:rPr lang="en-US" sz="3399">
+                <a:solidFill>
+                  <a:srgbClr val="000000"/>
+                </a:solidFill>
+                <a:latin typeface="Open Sans"/>
+                <a:ea typeface="Open Sans"/>
+                <a:cs typeface="Open Sans"/>
+                <a:sym typeface="Open Sans"/>
+              </a:rPr>
+              <a:t>Requerimientos No Funcionales</a:t>
+            </a:r>
+          </a:p>
+          <a:p>
+            <a:pPr marL="734059" lvl="1" indent="-367030" algn="ctr">
+              <a:lnSpc>
+                <a:spcPts val="4759"/>
+              </a:lnSpc>
+              <a:buAutoNum type="arabicPeriod"/>
+            </a:pPr>
+            <a:r>
+              <a:rPr lang="en-US" sz="3399">
+                <a:solidFill>
+                  <a:srgbClr val="000000"/>
+                </a:solidFill>
+                <a:latin typeface="Open Sans"/>
+                <a:ea typeface="Open Sans"/>
+                <a:cs typeface="Open Sans"/>
+                <a:sym typeface="Open Sans"/>
+              </a:rPr>
+              <a:t>Vista de Procesos</a:t>
+            </a:r>
+          </a:p>
+          <a:p>
+            <a:pPr marL="734059" lvl="1" indent="-367030" algn="ctr">
+              <a:lnSpc>
+                <a:spcPts val="4759"/>
+              </a:lnSpc>
+              <a:buAutoNum type="arabicPeriod"/>
+            </a:pPr>
+            <a:r>
+              <a:rPr lang="en-US" sz="3399">
+                <a:solidFill>
+                  <a:srgbClr val="000000"/>
+                </a:solidFill>
+                <a:latin typeface="Open Sans"/>
+                <a:ea typeface="Open Sans"/>
+                <a:cs typeface="Open Sans"/>
+                <a:sym typeface="Open Sans"/>
+              </a:rPr>
+              <a:t>Vista Física</a:t>
+            </a:r>
+          </a:p>
+          <a:p>
+            <a:pPr marL="734059" lvl="1" indent="-367030" algn="ctr">
+              <a:lnSpc>
+                <a:spcPts val="4759"/>
+              </a:lnSpc>
+              <a:buAutoNum type="arabicPeriod"/>
+            </a:pPr>
+            <a:r>
+              <a:rPr lang="en-US" sz="3399">
+                <a:solidFill>
+                  <a:srgbClr val="000000"/>
+                </a:solidFill>
+                <a:latin typeface="Open Sans"/>
+                <a:ea typeface="Open Sans"/>
+                <a:cs typeface="Open Sans"/>
+                <a:sym typeface="Open Sans"/>
+              </a:rPr>
+              <a:t>Escenarios</a:t>
+            </a:r>
+          </a:p>
+        </p:txBody>
+      </p:sp>
+      <p:sp>
+        <p:nvSpPr>
+          <p:cNvPr id="3" name="TextBox 3"/>
+          <p:cNvSpPr txBox="1"/>
+          <p:nvPr/>
+        </p:nvSpPr>
+        <p:spPr>
+          <a:xfrm>
+            <a:off x="7909203" y="537527"/>
+            <a:ext cx="2469594" cy="887095"/>
+          </a:xfrm>
+          <a:prstGeom prst="rect">
+            <a:avLst/>
+          </a:prstGeom>
+        </p:spPr>
+        <p:txBody>
+          <a:bodyPr lIns="0" tIns="0" rIns="0" bIns="0" rtlCol="0" anchor="t">
+            <a:spAutoFit/>
+          </a:bodyPr>
+          <a:lstStyle/>
+          <a:p>
+            <a:pPr algn="ctr">
+              <a:lnSpc>
+                <a:spcPts val="7279"/>
+              </a:lnSpc>
+            </a:pPr>
+            <a:r>
+              <a:rPr lang="en-US" sz="5199" b="1">
+                <a:solidFill>
+                  <a:srgbClr val="000000"/>
+                </a:solidFill>
+                <a:latin typeface="Open Sans Bold"/>
+                <a:ea typeface="Open Sans Bold"/>
+                <a:cs typeface="Open Sans Bold"/>
+                <a:sym typeface="Open Sans Bold"/>
+              </a:rPr>
+              <a:t>Agenda</a:t>
+            </a:r>
+          </a:p>
+        </p:txBody>
+      </p:sp>
+    </p:spTree>
+  </p:cSld>
+  <p:clrMapOvr>
+    <a:masterClrMapping/>
+  </p:clrMapOvr>
+</p:sld>
+</file>
+
+<file path=ppt/slides/slide20.xml><?xml version="1.0" encoding="utf-8"?>
 <p:sld xmlns:a="http://schemas.openxmlformats.org/drawingml/2006/main" xmlns:r="http://schemas.openxmlformats.org/officeDocument/2006/relationships" xmlns:p="http://schemas.openxmlformats.org/presentationml/2006/main">
   <p:cSld>
     <p:spTree>
@@ -5114,7 +5902,7 @@
 </p:sld>
 </file>
 
-<file path=ppt/slides/slide19.xml><?xml version="1.0" encoding="utf-8"?>
+<file path=ppt/slides/slide21.xml><?xml version="1.0" encoding="utf-8"?>
 <p:sld xmlns:a="http://schemas.openxmlformats.org/drawingml/2006/main" xmlns:r="http://schemas.openxmlformats.org/officeDocument/2006/relationships" xmlns:p="http://schemas.openxmlformats.org/presentationml/2006/main">
   <p:cSld>
     <p:spTree>
@@ -5139,8 +5927,8 @@
         </p:nvSpPr>
         <p:spPr>
           <a:xfrm>
-            <a:off x="6924198" y="495300"/>
-            <a:ext cx="4439603" cy="887095"/>
+            <a:off x="7114698" y="571500"/>
+            <a:ext cx="4058603" cy="887095"/>
           </a:xfrm>
           <a:prstGeom prst="rect">
             <a:avLst/>
@@ -5189,8 +5977,8 @@
         </p:nvSpPr>
         <p:spPr>
           <a:xfrm>
-            <a:off x="1028700" y="2419667"/>
-            <a:ext cx="16230600" cy="5380990"/>
+            <a:off x="1028699" y="2394189"/>
+            <a:ext cx="16230600" cy="5498621"/>
           </a:xfrm>
           <a:prstGeom prst="rect">
             <a:avLst/>
@@ -5208,91 +5996,1027 @@
               </a:lnSpc>
             </a:pPr>
             <a:r>
-              <a:rPr lang="en-US" sz="3399">
-                <a:solidFill>
-                  <a:srgbClr val="000000"/>
-                </a:solidFill>
-                <a:latin typeface="Open Sans"/>
-                <a:ea typeface="Open Sans"/>
-                <a:cs typeface="Open Sans"/>
-                <a:sym typeface="Open Sans"/>
-              </a:rPr>
-              <a:t>Para la vista física, se utiliza un diagrama de despliegue que retrata el contexto en el cual se ejecutará la aplicación, así mismo con otros elementos internos del </a:t>
-            </a:r>
-            <a:r>
-              <a:rPr lang="en-US" sz="3399" b="1">
-                <a:solidFill>
-                  <a:srgbClr val="000000"/>
-                </a:solidFill>
-                <a:latin typeface="Open Sans Bold"/>
-                <a:ea typeface="Open Sans Bold"/>
-                <a:cs typeface="Open Sans Bold"/>
-                <a:sym typeface="Open Sans Bold"/>
-              </a:rPr>
-              <a:t>dispositivo móvil</a:t>
-            </a:r>
-            <a:r>
-              <a:rPr lang="en-US" sz="3399">
-                <a:solidFill>
-                  <a:srgbClr val="000000"/>
-                </a:solidFill>
-                <a:latin typeface="Open Sans"/>
-                <a:ea typeface="Open Sans"/>
-                <a:cs typeface="Open Sans"/>
-                <a:sym typeface="Open Sans"/>
-              </a:rPr>
-              <a:t> donde se encuentre. En este caso, el ambiente donde se ejecuta (</a:t>
-            </a:r>
-            <a:r>
-              <a:rPr lang="en-US" sz="3399" b="1">
-                <a:solidFill>
-                  <a:srgbClr val="000000"/>
-                </a:solidFill>
-                <a:latin typeface="Open Sans Bold"/>
-                <a:ea typeface="Open Sans Bold"/>
-                <a:cs typeface="Open Sans Bold"/>
-                <a:sym typeface="Open Sans Bold"/>
-              </a:rPr>
-              <a:t>Sistema Operativo</a:t>
-            </a:r>
-            <a:r>
-              <a:rPr lang="en-US" sz="3399">
-                <a:solidFill>
-                  <a:srgbClr val="000000"/>
-                </a:solidFill>
-                <a:latin typeface="Open Sans"/>
-                <a:ea typeface="Open Sans"/>
-                <a:cs typeface="Open Sans"/>
-                <a:sym typeface="Open Sans"/>
-              </a:rPr>
-              <a:t>), el </a:t>
-            </a:r>
-            <a:r>
-              <a:rPr lang="en-US" sz="3399" b="1">
-                <a:solidFill>
-                  <a:srgbClr val="000000"/>
-                </a:solidFill>
-                <a:latin typeface="Open Sans Bold"/>
-                <a:ea typeface="Open Sans Bold"/>
-                <a:cs typeface="Open Sans Bold"/>
-                <a:sym typeface="Open Sans Bold"/>
-              </a:rPr>
-              <a:t>almacenamiento </a:t>
-            </a:r>
-            <a:r>
-              <a:rPr lang="en-US" sz="3399">
-                <a:solidFill>
-                  <a:srgbClr val="000000"/>
-                </a:solidFill>
-                <a:latin typeface="Open Sans"/>
-                <a:ea typeface="Open Sans"/>
-                <a:cs typeface="Open Sans"/>
-                <a:sym typeface="Open Sans"/>
-              </a:rPr>
-              <a:t>con el que interactúa y los archivos internos que se espera que con la aplicación se espera que manipule. Al igual, se representa </a:t>
-            </a:r>
-            <a:r>
-              <a:rPr lang="en-US" sz="3399" b="1">
+              <a:rPr lang="en-US" sz="3399" dirty="0">
+                <a:solidFill>
+                  <a:srgbClr val="000000"/>
+                </a:solidFill>
+                <a:latin typeface="Open Sans"/>
+                <a:ea typeface="Open Sans"/>
+                <a:cs typeface="Open Sans"/>
+                <a:sym typeface="Open Sans"/>
+              </a:rPr>
+              <a:t>Para la vista </a:t>
+            </a:r>
+            <a:r>
+              <a:rPr lang="en-US" sz="3399" dirty="0" err="1">
+                <a:solidFill>
+                  <a:srgbClr val="000000"/>
+                </a:solidFill>
+                <a:latin typeface="Open Sans"/>
+                <a:ea typeface="Open Sans"/>
+                <a:cs typeface="Open Sans"/>
+                <a:sym typeface="Open Sans"/>
+              </a:rPr>
+              <a:t>física</a:t>
+            </a:r>
+            <a:r>
+              <a:rPr lang="en-US" sz="3399" dirty="0">
+                <a:solidFill>
+                  <a:srgbClr val="000000"/>
+                </a:solidFill>
+                <a:latin typeface="Open Sans"/>
+                <a:ea typeface="Open Sans"/>
+                <a:cs typeface="Open Sans"/>
+                <a:sym typeface="Open Sans"/>
+              </a:rPr>
+              <a:t>, se </a:t>
+            </a:r>
+            <a:r>
+              <a:rPr lang="en-US" sz="3399" dirty="0" err="1">
+                <a:solidFill>
+                  <a:srgbClr val="000000"/>
+                </a:solidFill>
+                <a:latin typeface="Open Sans"/>
+                <a:ea typeface="Open Sans"/>
+                <a:cs typeface="Open Sans"/>
+                <a:sym typeface="Open Sans"/>
+              </a:rPr>
+              <a:t>utiliza</a:t>
+            </a:r>
+            <a:r>
+              <a:rPr lang="en-US" sz="3399" dirty="0">
+                <a:solidFill>
+                  <a:srgbClr val="000000"/>
+                </a:solidFill>
+                <a:latin typeface="Open Sans"/>
+                <a:ea typeface="Open Sans"/>
+                <a:cs typeface="Open Sans"/>
+                <a:sym typeface="Open Sans"/>
+              </a:rPr>
+              <a:t> un </a:t>
+            </a:r>
+            <a:r>
+              <a:rPr lang="en-US" sz="3399" dirty="0" err="1">
+                <a:solidFill>
+                  <a:srgbClr val="000000"/>
+                </a:solidFill>
+                <a:latin typeface="Open Sans"/>
+                <a:ea typeface="Open Sans"/>
+                <a:cs typeface="Open Sans"/>
+                <a:sym typeface="Open Sans"/>
+              </a:rPr>
+              <a:t>diagrama</a:t>
+            </a:r>
+            <a:r>
+              <a:rPr lang="en-US" sz="3399" dirty="0">
+                <a:solidFill>
+                  <a:srgbClr val="000000"/>
+                </a:solidFill>
+                <a:latin typeface="Open Sans"/>
+                <a:ea typeface="Open Sans"/>
+                <a:cs typeface="Open Sans"/>
+                <a:sym typeface="Open Sans"/>
+              </a:rPr>
+              <a:t> de </a:t>
+            </a:r>
+            <a:r>
+              <a:rPr lang="en-US" sz="3399" dirty="0" err="1">
+                <a:solidFill>
+                  <a:srgbClr val="000000"/>
+                </a:solidFill>
+                <a:latin typeface="Open Sans"/>
+                <a:ea typeface="Open Sans"/>
+                <a:cs typeface="Open Sans"/>
+                <a:sym typeface="Open Sans"/>
+              </a:rPr>
+              <a:t>despliegue</a:t>
+            </a:r>
+            <a:r>
+              <a:rPr lang="en-US" sz="3399" dirty="0">
+                <a:solidFill>
+                  <a:srgbClr val="000000"/>
+                </a:solidFill>
+                <a:latin typeface="Open Sans"/>
+                <a:ea typeface="Open Sans"/>
+                <a:cs typeface="Open Sans"/>
+                <a:sym typeface="Open Sans"/>
+              </a:rPr>
+              <a:t> que </a:t>
+            </a:r>
+            <a:r>
+              <a:rPr lang="en-US" sz="3399" dirty="0" err="1">
+                <a:solidFill>
+                  <a:srgbClr val="000000"/>
+                </a:solidFill>
+                <a:latin typeface="Open Sans"/>
+                <a:ea typeface="Open Sans"/>
+                <a:cs typeface="Open Sans"/>
+                <a:sym typeface="Open Sans"/>
+              </a:rPr>
+              <a:t>retrata</a:t>
+            </a:r>
+            <a:r>
+              <a:rPr lang="en-US" sz="3399" dirty="0">
+                <a:solidFill>
+                  <a:srgbClr val="000000"/>
+                </a:solidFill>
+                <a:latin typeface="Open Sans"/>
+                <a:ea typeface="Open Sans"/>
+                <a:cs typeface="Open Sans"/>
+                <a:sym typeface="Open Sans"/>
+              </a:rPr>
+              <a:t> </a:t>
+            </a:r>
+            <a:r>
+              <a:rPr lang="en-US" sz="3399" dirty="0" err="1">
+                <a:solidFill>
+                  <a:srgbClr val="000000"/>
+                </a:solidFill>
+                <a:latin typeface="Open Sans"/>
+                <a:ea typeface="Open Sans"/>
+                <a:cs typeface="Open Sans"/>
+                <a:sym typeface="Open Sans"/>
+              </a:rPr>
+              <a:t>el</a:t>
+            </a:r>
+            <a:r>
+              <a:rPr lang="en-US" sz="3399" dirty="0">
+                <a:solidFill>
+                  <a:srgbClr val="000000"/>
+                </a:solidFill>
+                <a:latin typeface="Open Sans"/>
+                <a:ea typeface="Open Sans"/>
+                <a:cs typeface="Open Sans"/>
+                <a:sym typeface="Open Sans"/>
+              </a:rPr>
+              <a:t> </a:t>
+            </a:r>
+            <a:r>
+              <a:rPr lang="en-US" sz="3399" dirty="0" err="1">
+                <a:solidFill>
+                  <a:srgbClr val="000000"/>
+                </a:solidFill>
+                <a:latin typeface="Open Sans"/>
+                <a:ea typeface="Open Sans"/>
+                <a:cs typeface="Open Sans"/>
+                <a:sym typeface="Open Sans"/>
+              </a:rPr>
+              <a:t>contexto</a:t>
+            </a:r>
+            <a:r>
+              <a:rPr lang="en-US" sz="3399" dirty="0">
+                <a:solidFill>
+                  <a:srgbClr val="000000"/>
+                </a:solidFill>
+                <a:latin typeface="Open Sans"/>
+                <a:ea typeface="Open Sans"/>
+                <a:cs typeface="Open Sans"/>
+                <a:sym typeface="Open Sans"/>
+              </a:rPr>
+              <a:t> </a:t>
+            </a:r>
+            <a:r>
+              <a:rPr lang="en-US" sz="3399" dirty="0" err="1">
+                <a:solidFill>
+                  <a:srgbClr val="000000"/>
+                </a:solidFill>
+                <a:latin typeface="Open Sans"/>
+                <a:ea typeface="Open Sans"/>
+                <a:cs typeface="Open Sans"/>
+                <a:sym typeface="Open Sans"/>
+              </a:rPr>
+              <a:t>en</a:t>
+            </a:r>
+            <a:r>
+              <a:rPr lang="en-US" sz="3399" dirty="0">
+                <a:solidFill>
+                  <a:srgbClr val="000000"/>
+                </a:solidFill>
+                <a:latin typeface="Open Sans"/>
+                <a:ea typeface="Open Sans"/>
+                <a:cs typeface="Open Sans"/>
+                <a:sym typeface="Open Sans"/>
+              </a:rPr>
+              <a:t> </a:t>
+            </a:r>
+            <a:r>
+              <a:rPr lang="en-US" sz="3399" dirty="0" err="1">
+                <a:solidFill>
+                  <a:srgbClr val="000000"/>
+                </a:solidFill>
+                <a:latin typeface="Open Sans"/>
+                <a:ea typeface="Open Sans"/>
+                <a:cs typeface="Open Sans"/>
+                <a:sym typeface="Open Sans"/>
+              </a:rPr>
+              <a:t>el</a:t>
+            </a:r>
+            <a:r>
+              <a:rPr lang="en-US" sz="3399" dirty="0">
+                <a:solidFill>
+                  <a:srgbClr val="000000"/>
+                </a:solidFill>
+                <a:latin typeface="Open Sans"/>
+                <a:ea typeface="Open Sans"/>
+                <a:cs typeface="Open Sans"/>
+                <a:sym typeface="Open Sans"/>
+              </a:rPr>
+              <a:t> </a:t>
+            </a:r>
+            <a:r>
+              <a:rPr lang="en-US" sz="3399" dirty="0" err="1">
+                <a:solidFill>
+                  <a:srgbClr val="000000"/>
+                </a:solidFill>
+                <a:latin typeface="Open Sans"/>
+                <a:ea typeface="Open Sans"/>
+                <a:cs typeface="Open Sans"/>
+                <a:sym typeface="Open Sans"/>
+              </a:rPr>
+              <a:t>cual</a:t>
+            </a:r>
+            <a:r>
+              <a:rPr lang="en-US" sz="3399" dirty="0">
+                <a:solidFill>
+                  <a:srgbClr val="000000"/>
+                </a:solidFill>
+                <a:latin typeface="Open Sans"/>
+                <a:ea typeface="Open Sans"/>
+                <a:cs typeface="Open Sans"/>
+                <a:sym typeface="Open Sans"/>
+              </a:rPr>
+              <a:t> se </a:t>
+            </a:r>
+            <a:r>
+              <a:rPr lang="en-US" sz="3399" dirty="0" err="1">
+                <a:solidFill>
+                  <a:srgbClr val="000000"/>
+                </a:solidFill>
+                <a:latin typeface="Open Sans"/>
+                <a:ea typeface="Open Sans"/>
+                <a:cs typeface="Open Sans"/>
+                <a:sym typeface="Open Sans"/>
+              </a:rPr>
+              <a:t>ejecutará</a:t>
+            </a:r>
+            <a:r>
+              <a:rPr lang="en-US" sz="3399" dirty="0">
+                <a:solidFill>
+                  <a:srgbClr val="000000"/>
+                </a:solidFill>
+                <a:latin typeface="Open Sans"/>
+                <a:ea typeface="Open Sans"/>
+                <a:cs typeface="Open Sans"/>
+                <a:sym typeface="Open Sans"/>
+              </a:rPr>
+              <a:t> la </a:t>
+            </a:r>
+            <a:r>
+              <a:rPr lang="en-US" sz="3399" dirty="0" err="1">
+                <a:solidFill>
+                  <a:srgbClr val="000000"/>
+                </a:solidFill>
+                <a:latin typeface="Open Sans"/>
+                <a:ea typeface="Open Sans"/>
+                <a:cs typeface="Open Sans"/>
+                <a:sym typeface="Open Sans"/>
+              </a:rPr>
+              <a:t>aplicación</a:t>
+            </a:r>
+            <a:r>
+              <a:rPr lang="en-US" sz="3399" dirty="0">
+                <a:solidFill>
+                  <a:srgbClr val="000000"/>
+                </a:solidFill>
+                <a:latin typeface="Open Sans"/>
+                <a:ea typeface="Open Sans"/>
+                <a:cs typeface="Open Sans"/>
+                <a:sym typeface="Open Sans"/>
+              </a:rPr>
+              <a:t>, </a:t>
+            </a:r>
+            <a:r>
+              <a:rPr lang="en-US" sz="3399" dirty="0" err="1">
+                <a:solidFill>
+                  <a:srgbClr val="000000"/>
+                </a:solidFill>
+                <a:latin typeface="Open Sans"/>
+                <a:ea typeface="Open Sans"/>
+                <a:cs typeface="Open Sans"/>
+                <a:sym typeface="Open Sans"/>
+              </a:rPr>
+              <a:t>así</a:t>
+            </a:r>
+            <a:r>
+              <a:rPr lang="en-US" sz="3399" dirty="0">
+                <a:solidFill>
+                  <a:srgbClr val="000000"/>
+                </a:solidFill>
+                <a:latin typeface="Open Sans"/>
+                <a:ea typeface="Open Sans"/>
+                <a:cs typeface="Open Sans"/>
+                <a:sym typeface="Open Sans"/>
+              </a:rPr>
+              <a:t> </a:t>
+            </a:r>
+            <a:r>
+              <a:rPr lang="en-US" sz="3399" dirty="0" err="1">
+                <a:solidFill>
+                  <a:srgbClr val="000000"/>
+                </a:solidFill>
+                <a:latin typeface="Open Sans"/>
+                <a:ea typeface="Open Sans"/>
+                <a:cs typeface="Open Sans"/>
+                <a:sym typeface="Open Sans"/>
+              </a:rPr>
+              <a:t>mismo</a:t>
+            </a:r>
+            <a:r>
+              <a:rPr lang="en-US" sz="3399" dirty="0">
+                <a:solidFill>
+                  <a:srgbClr val="000000"/>
+                </a:solidFill>
+                <a:latin typeface="Open Sans"/>
+                <a:ea typeface="Open Sans"/>
+                <a:cs typeface="Open Sans"/>
+                <a:sym typeface="Open Sans"/>
+              </a:rPr>
+              <a:t> con </a:t>
+            </a:r>
+            <a:r>
+              <a:rPr lang="en-US" sz="3399" dirty="0" err="1">
+                <a:solidFill>
+                  <a:srgbClr val="000000"/>
+                </a:solidFill>
+                <a:latin typeface="Open Sans"/>
+                <a:ea typeface="Open Sans"/>
+                <a:cs typeface="Open Sans"/>
+                <a:sym typeface="Open Sans"/>
+              </a:rPr>
+              <a:t>otros</a:t>
+            </a:r>
+            <a:r>
+              <a:rPr lang="en-US" sz="3399" dirty="0">
+                <a:solidFill>
+                  <a:srgbClr val="000000"/>
+                </a:solidFill>
+                <a:latin typeface="Open Sans"/>
+                <a:ea typeface="Open Sans"/>
+                <a:cs typeface="Open Sans"/>
+                <a:sym typeface="Open Sans"/>
+              </a:rPr>
+              <a:t> </a:t>
+            </a:r>
+            <a:r>
+              <a:rPr lang="en-US" sz="3399" dirty="0" err="1">
+                <a:solidFill>
+                  <a:srgbClr val="000000"/>
+                </a:solidFill>
+                <a:latin typeface="Open Sans"/>
+                <a:ea typeface="Open Sans"/>
+                <a:cs typeface="Open Sans"/>
+                <a:sym typeface="Open Sans"/>
+              </a:rPr>
+              <a:t>elementos</a:t>
+            </a:r>
+            <a:r>
+              <a:rPr lang="en-US" sz="3399" dirty="0">
+                <a:solidFill>
+                  <a:srgbClr val="000000"/>
+                </a:solidFill>
+                <a:latin typeface="Open Sans"/>
+                <a:ea typeface="Open Sans"/>
+                <a:cs typeface="Open Sans"/>
+                <a:sym typeface="Open Sans"/>
+              </a:rPr>
+              <a:t> </a:t>
+            </a:r>
+            <a:r>
+              <a:rPr lang="en-US" sz="3399" dirty="0" err="1">
+                <a:solidFill>
+                  <a:srgbClr val="000000"/>
+                </a:solidFill>
+                <a:latin typeface="Open Sans"/>
+                <a:ea typeface="Open Sans"/>
+                <a:cs typeface="Open Sans"/>
+                <a:sym typeface="Open Sans"/>
+              </a:rPr>
+              <a:t>internos</a:t>
+            </a:r>
+            <a:r>
+              <a:rPr lang="en-US" sz="3399" dirty="0">
+                <a:solidFill>
+                  <a:srgbClr val="000000"/>
+                </a:solidFill>
+                <a:latin typeface="Open Sans"/>
+                <a:ea typeface="Open Sans"/>
+                <a:cs typeface="Open Sans"/>
+                <a:sym typeface="Open Sans"/>
+              </a:rPr>
+              <a:t> del </a:t>
+            </a:r>
+            <a:r>
+              <a:rPr lang="en-US" sz="3399" b="1" dirty="0" err="1">
+                <a:solidFill>
+                  <a:srgbClr val="000000"/>
+                </a:solidFill>
+                <a:latin typeface="Open Sans Bold"/>
+                <a:ea typeface="Open Sans Bold"/>
+                <a:cs typeface="Open Sans Bold"/>
+                <a:sym typeface="Open Sans Bold"/>
+              </a:rPr>
+              <a:t>dispositivo</a:t>
+            </a:r>
+            <a:r>
+              <a:rPr lang="en-US" sz="3399" b="1" dirty="0">
+                <a:solidFill>
+                  <a:srgbClr val="000000"/>
+                </a:solidFill>
+                <a:latin typeface="Open Sans Bold"/>
+                <a:ea typeface="Open Sans Bold"/>
+                <a:cs typeface="Open Sans Bold"/>
+                <a:sym typeface="Open Sans Bold"/>
+              </a:rPr>
+              <a:t> </a:t>
+            </a:r>
+            <a:r>
+              <a:rPr lang="en-US" sz="3399" b="1" dirty="0" err="1">
+                <a:solidFill>
+                  <a:srgbClr val="000000"/>
+                </a:solidFill>
+                <a:latin typeface="Open Sans Bold"/>
+                <a:ea typeface="Open Sans Bold"/>
+                <a:cs typeface="Open Sans Bold"/>
+                <a:sym typeface="Open Sans Bold"/>
+              </a:rPr>
+              <a:t>móvil</a:t>
+            </a:r>
+            <a:r>
+              <a:rPr lang="en-US" sz="3399" dirty="0">
+                <a:solidFill>
+                  <a:srgbClr val="000000"/>
+                </a:solidFill>
+                <a:latin typeface="Open Sans"/>
+                <a:ea typeface="Open Sans"/>
+                <a:cs typeface="Open Sans"/>
+                <a:sym typeface="Open Sans"/>
+              </a:rPr>
+              <a:t> </a:t>
+            </a:r>
+            <a:r>
+              <a:rPr lang="en-US" sz="3399" dirty="0" err="1">
+                <a:solidFill>
+                  <a:srgbClr val="000000"/>
+                </a:solidFill>
+                <a:latin typeface="Open Sans"/>
+                <a:ea typeface="Open Sans"/>
+                <a:cs typeface="Open Sans"/>
+                <a:sym typeface="Open Sans"/>
+              </a:rPr>
+              <a:t>donde</a:t>
+            </a:r>
+            <a:r>
+              <a:rPr lang="en-US" sz="3399" dirty="0">
+                <a:solidFill>
+                  <a:srgbClr val="000000"/>
+                </a:solidFill>
+                <a:latin typeface="Open Sans"/>
+                <a:ea typeface="Open Sans"/>
+                <a:cs typeface="Open Sans"/>
+                <a:sym typeface="Open Sans"/>
+              </a:rPr>
+              <a:t> se </a:t>
+            </a:r>
+            <a:r>
+              <a:rPr lang="en-US" sz="3399" dirty="0" err="1">
+                <a:solidFill>
+                  <a:srgbClr val="000000"/>
+                </a:solidFill>
+                <a:latin typeface="Open Sans"/>
+                <a:ea typeface="Open Sans"/>
+                <a:cs typeface="Open Sans"/>
+                <a:sym typeface="Open Sans"/>
+              </a:rPr>
+              <a:t>encuentre</a:t>
+            </a:r>
+            <a:r>
+              <a:rPr lang="en-US" sz="3399" dirty="0">
+                <a:solidFill>
+                  <a:srgbClr val="000000"/>
+                </a:solidFill>
+                <a:latin typeface="Open Sans"/>
+                <a:ea typeface="Open Sans"/>
+                <a:cs typeface="Open Sans"/>
+                <a:sym typeface="Open Sans"/>
+              </a:rPr>
+              <a:t>. En </a:t>
+            </a:r>
+            <a:r>
+              <a:rPr lang="en-US" sz="3399" dirty="0" err="1">
+                <a:solidFill>
+                  <a:srgbClr val="000000"/>
+                </a:solidFill>
+                <a:latin typeface="Open Sans"/>
+                <a:ea typeface="Open Sans"/>
+                <a:cs typeface="Open Sans"/>
+                <a:sym typeface="Open Sans"/>
+              </a:rPr>
+              <a:t>este</a:t>
+            </a:r>
+            <a:r>
+              <a:rPr lang="en-US" sz="3399" dirty="0">
+                <a:solidFill>
+                  <a:srgbClr val="000000"/>
+                </a:solidFill>
+                <a:latin typeface="Open Sans"/>
+                <a:ea typeface="Open Sans"/>
+                <a:cs typeface="Open Sans"/>
+                <a:sym typeface="Open Sans"/>
+              </a:rPr>
+              <a:t> </a:t>
+            </a:r>
+            <a:r>
+              <a:rPr lang="en-US" sz="3399" dirty="0" err="1">
+                <a:solidFill>
+                  <a:srgbClr val="000000"/>
+                </a:solidFill>
+                <a:latin typeface="Open Sans"/>
+                <a:ea typeface="Open Sans"/>
+                <a:cs typeface="Open Sans"/>
+                <a:sym typeface="Open Sans"/>
+              </a:rPr>
+              <a:t>caso</a:t>
+            </a:r>
+            <a:r>
+              <a:rPr lang="en-US" sz="3399" dirty="0">
+                <a:solidFill>
+                  <a:srgbClr val="000000"/>
+                </a:solidFill>
+                <a:latin typeface="Open Sans"/>
+                <a:ea typeface="Open Sans"/>
+                <a:cs typeface="Open Sans"/>
+                <a:sym typeface="Open Sans"/>
+              </a:rPr>
+              <a:t>, </a:t>
+            </a:r>
+            <a:r>
+              <a:rPr lang="en-US" sz="3399" dirty="0" err="1">
+                <a:solidFill>
+                  <a:srgbClr val="000000"/>
+                </a:solidFill>
+                <a:latin typeface="Open Sans"/>
+                <a:ea typeface="Open Sans"/>
+                <a:cs typeface="Open Sans"/>
+                <a:sym typeface="Open Sans"/>
+              </a:rPr>
+              <a:t>el</a:t>
+            </a:r>
+            <a:r>
+              <a:rPr lang="en-US" sz="3399" dirty="0">
+                <a:solidFill>
+                  <a:srgbClr val="000000"/>
+                </a:solidFill>
+                <a:latin typeface="Open Sans"/>
+                <a:ea typeface="Open Sans"/>
+                <a:cs typeface="Open Sans"/>
+                <a:sym typeface="Open Sans"/>
+              </a:rPr>
+              <a:t> </a:t>
+            </a:r>
+            <a:r>
+              <a:rPr lang="en-US" sz="3399" dirty="0" err="1">
+                <a:solidFill>
+                  <a:srgbClr val="000000"/>
+                </a:solidFill>
+                <a:latin typeface="Open Sans"/>
+                <a:ea typeface="Open Sans"/>
+                <a:cs typeface="Open Sans"/>
+                <a:sym typeface="Open Sans"/>
+              </a:rPr>
+              <a:t>ambiente</a:t>
+            </a:r>
+            <a:r>
+              <a:rPr lang="en-US" sz="3399" dirty="0">
+                <a:solidFill>
+                  <a:srgbClr val="000000"/>
+                </a:solidFill>
+                <a:latin typeface="Open Sans"/>
+                <a:ea typeface="Open Sans"/>
+                <a:cs typeface="Open Sans"/>
+                <a:sym typeface="Open Sans"/>
+              </a:rPr>
+              <a:t> </a:t>
+            </a:r>
+            <a:r>
+              <a:rPr lang="en-US" sz="3399" dirty="0" err="1">
+                <a:solidFill>
+                  <a:srgbClr val="000000"/>
+                </a:solidFill>
+                <a:latin typeface="Open Sans"/>
+                <a:ea typeface="Open Sans"/>
+                <a:cs typeface="Open Sans"/>
+                <a:sym typeface="Open Sans"/>
+              </a:rPr>
+              <a:t>donde</a:t>
+            </a:r>
+            <a:r>
+              <a:rPr lang="en-US" sz="3399" dirty="0">
+                <a:solidFill>
+                  <a:srgbClr val="000000"/>
+                </a:solidFill>
+                <a:latin typeface="Open Sans"/>
+                <a:ea typeface="Open Sans"/>
+                <a:cs typeface="Open Sans"/>
+                <a:sym typeface="Open Sans"/>
+              </a:rPr>
+              <a:t> se </a:t>
+            </a:r>
+            <a:r>
+              <a:rPr lang="en-US" sz="3399" dirty="0" err="1">
+                <a:solidFill>
+                  <a:srgbClr val="000000"/>
+                </a:solidFill>
+                <a:latin typeface="Open Sans"/>
+                <a:ea typeface="Open Sans"/>
+                <a:cs typeface="Open Sans"/>
+                <a:sym typeface="Open Sans"/>
+              </a:rPr>
+              <a:t>ejecuta</a:t>
+            </a:r>
+            <a:r>
+              <a:rPr lang="en-US" sz="3399" dirty="0">
+                <a:solidFill>
+                  <a:srgbClr val="000000"/>
+                </a:solidFill>
+                <a:latin typeface="Open Sans"/>
+                <a:ea typeface="Open Sans"/>
+                <a:cs typeface="Open Sans"/>
+                <a:sym typeface="Open Sans"/>
+              </a:rPr>
+              <a:t> (</a:t>
+            </a:r>
+            <a:r>
+              <a:rPr lang="en-US" sz="3399" b="1" dirty="0">
+                <a:solidFill>
+                  <a:srgbClr val="000000"/>
+                </a:solidFill>
+                <a:latin typeface="Open Sans Bold"/>
+                <a:ea typeface="Open Sans Bold"/>
+                <a:cs typeface="Open Sans Bold"/>
+                <a:sym typeface="Open Sans Bold"/>
+              </a:rPr>
+              <a:t>Sistema </a:t>
+            </a:r>
+            <a:r>
+              <a:rPr lang="en-US" sz="3399" b="1" dirty="0" err="1">
+                <a:solidFill>
+                  <a:srgbClr val="000000"/>
+                </a:solidFill>
+                <a:latin typeface="Open Sans Bold"/>
+                <a:ea typeface="Open Sans Bold"/>
+                <a:cs typeface="Open Sans Bold"/>
+                <a:sym typeface="Open Sans Bold"/>
+              </a:rPr>
+              <a:t>Operativo</a:t>
+            </a:r>
+            <a:r>
+              <a:rPr lang="en-US" sz="3399" dirty="0">
+                <a:solidFill>
+                  <a:srgbClr val="000000"/>
+                </a:solidFill>
+                <a:latin typeface="Open Sans"/>
+                <a:ea typeface="Open Sans"/>
+                <a:cs typeface="Open Sans"/>
+                <a:sym typeface="Open Sans"/>
+              </a:rPr>
+              <a:t>), </a:t>
+            </a:r>
+            <a:r>
+              <a:rPr lang="en-US" sz="3399" dirty="0" err="1">
+                <a:solidFill>
+                  <a:srgbClr val="000000"/>
+                </a:solidFill>
+                <a:latin typeface="Open Sans"/>
+                <a:ea typeface="Open Sans"/>
+                <a:cs typeface="Open Sans"/>
+                <a:sym typeface="Open Sans"/>
+              </a:rPr>
+              <a:t>el</a:t>
+            </a:r>
+            <a:r>
+              <a:rPr lang="en-US" sz="3399" dirty="0">
+                <a:solidFill>
+                  <a:srgbClr val="000000"/>
+                </a:solidFill>
+                <a:latin typeface="Open Sans"/>
+                <a:ea typeface="Open Sans"/>
+                <a:cs typeface="Open Sans"/>
+                <a:sym typeface="Open Sans"/>
+              </a:rPr>
+              <a:t> </a:t>
+            </a:r>
+            <a:r>
+              <a:rPr lang="en-US" sz="3399" b="1" dirty="0" err="1">
+                <a:solidFill>
+                  <a:srgbClr val="000000"/>
+                </a:solidFill>
+                <a:latin typeface="Open Sans Bold"/>
+                <a:ea typeface="Open Sans Bold"/>
+                <a:cs typeface="Open Sans Bold"/>
+                <a:sym typeface="Open Sans Bold"/>
+              </a:rPr>
+              <a:t>almacenamiento</a:t>
+            </a:r>
+            <a:r>
+              <a:rPr lang="en-US" sz="3399" b="1" dirty="0">
+                <a:solidFill>
+                  <a:srgbClr val="000000"/>
+                </a:solidFill>
+                <a:latin typeface="Open Sans Bold"/>
+                <a:ea typeface="Open Sans Bold"/>
+                <a:cs typeface="Open Sans Bold"/>
+                <a:sym typeface="Open Sans Bold"/>
+              </a:rPr>
+              <a:t> </a:t>
+            </a:r>
+            <a:r>
+              <a:rPr lang="en-US" sz="3399" dirty="0">
+                <a:solidFill>
+                  <a:srgbClr val="000000"/>
+                </a:solidFill>
+                <a:latin typeface="Open Sans"/>
+                <a:ea typeface="Open Sans"/>
+                <a:cs typeface="Open Sans"/>
+                <a:sym typeface="Open Sans"/>
+              </a:rPr>
+              <a:t>con </a:t>
+            </a:r>
+            <a:r>
+              <a:rPr lang="en-US" sz="3399" dirty="0" err="1">
+                <a:solidFill>
+                  <a:srgbClr val="000000"/>
+                </a:solidFill>
+                <a:latin typeface="Open Sans"/>
+                <a:ea typeface="Open Sans"/>
+                <a:cs typeface="Open Sans"/>
+                <a:sym typeface="Open Sans"/>
+              </a:rPr>
+              <a:t>el</a:t>
+            </a:r>
+            <a:r>
+              <a:rPr lang="en-US" sz="3399" dirty="0">
+                <a:solidFill>
+                  <a:srgbClr val="000000"/>
+                </a:solidFill>
+                <a:latin typeface="Open Sans"/>
+                <a:ea typeface="Open Sans"/>
+                <a:cs typeface="Open Sans"/>
+                <a:sym typeface="Open Sans"/>
+              </a:rPr>
+              <a:t> que </a:t>
+            </a:r>
+            <a:r>
+              <a:rPr lang="en-US" sz="3399" dirty="0" err="1">
+                <a:solidFill>
+                  <a:srgbClr val="000000"/>
+                </a:solidFill>
+                <a:latin typeface="Open Sans"/>
+                <a:ea typeface="Open Sans"/>
+                <a:cs typeface="Open Sans"/>
+                <a:sym typeface="Open Sans"/>
+              </a:rPr>
+              <a:t>interactúa</a:t>
+            </a:r>
+            <a:r>
+              <a:rPr lang="en-US" sz="3399" dirty="0">
+                <a:solidFill>
+                  <a:srgbClr val="000000"/>
+                </a:solidFill>
+                <a:latin typeface="Open Sans"/>
+                <a:ea typeface="Open Sans"/>
+                <a:cs typeface="Open Sans"/>
+                <a:sym typeface="Open Sans"/>
+              </a:rPr>
+              <a:t> y </a:t>
+            </a:r>
+            <a:r>
+              <a:rPr lang="en-US" sz="3399" dirty="0" err="1">
+                <a:solidFill>
+                  <a:srgbClr val="000000"/>
+                </a:solidFill>
+                <a:latin typeface="Open Sans"/>
+                <a:ea typeface="Open Sans"/>
+                <a:cs typeface="Open Sans"/>
+                <a:sym typeface="Open Sans"/>
+              </a:rPr>
+              <a:t>los</a:t>
+            </a:r>
+            <a:r>
+              <a:rPr lang="en-US" sz="3399" dirty="0">
+                <a:solidFill>
+                  <a:srgbClr val="000000"/>
+                </a:solidFill>
+                <a:latin typeface="Open Sans"/>
+                <a:ea typeface="Open Sans"/>
+                <a:cs typeface="Open Sans"/>
+                <a:sym typeface="Open Sans"/>
+              </a:rPr>
+              <a:t> </a:t>
+            </a:r>
+            <a:r>
+              <a:rPr lang="en-US" sz="3399" dirty="0" err="1">
+                <a:solidFill>
+                  <a:srgbClr val="000000"/>
+                </a:solidFill>
+                <a:latin typeface="Open Sans"/>
+                <a:ea typeface="Open Sans"/>
+                <a:cs typeface="Open Sans"/>
+                <a:sym typeface="Open Sans"/>
+              </a:rPr>
+              <a:t>archivos</a:t>
+            </a:r>
+            <a:r>
+              <a:rPr lang="en-US" sz="3399" dirty="0">
+                <a:solidFill>
+                  <a:srgbClr val="000000"/>
+                </a:solidFill>
+                <a:latin typeface="Open Sans"/>
+                <a:ea typeface="Open Sans"/>
+                <a:cs typeface="Open Sans"/>
+                <a:sym typeface="Open Sans"/>
+              </a:rPr>
+              <a:t> </a:t>
+            </a:r>
+            <a:r>
+              <a:rPr lang="en-US" sz="3399" dirty="0" err="1">
+                <a:solidFill>
+                  <a:srgbClr val="000000"/>
+                </a:solidFill>
+                <a:latin typeface="Open Sans"/>
+                <a:ea typeface="Open Sans"/>
+                <a:cs typeface="Open Sans"/>
+                <a:sym typeface="Open Sans"/>
+              </a:rPr>
+              <a:t>internos</a:t>
+            </a:r>
+            <a:r>
+              <a:rPr lang="en-US" sz="3399" dirty="0">
+                <a:solidFill>
+                  <a:srgbClr val="000000"/>
+                </a:solidFill>
+                <a:latin typeface="Open Sans"/>
+                <a:ea typeface="Open Sans"/>
+                <a:cs typeface="Open Sans"/>
+                <a:sym typeface="Open Sans"/>
+              </a:rPr>
+              <a:t> que se </a:t>
+            </a:r>
+            <a:r>
+              <a:rPr lang="en-US" sz="3399" dirty="0" err="1">
+                <a:solidFill>
+                  <a:srgbClr val="000000"/>
+                </a:solidFill>
+                <a:latin typeface="Open Sans"/>
+                <a:ea typeface="Open Sans"/>
+                <a:cs typeface="Open Sans"/>
+                <a:sym typeface="Open Sans"/>
+              </a:rPr>
+              <a:t>espera</a:t>
+            </a:r>
+            <a:r>
+              <a:rPr lang="en-US" sz="3399" dirty="0">
+                <a:solidFill>
+                  <a:srgbClr val="000000"/>
+                </a:solidFill>
+                <a:latin typeface="Open Sans"/>
+                <a:ea typeface="Open Sans"/>
+                <a:cs typeface="Open Sans"/>
+                <a:sym typeface="Open Sans"/>
+              </a:rPr>
+              <a:t> que con la </a:t>
+            </a:r>
+            <a:r>
+              <a:rPr lang="en-US" sz="3399" dirty="0" err="1">
+                <a:solidFill>
+                  <a:srgbClr val="000000"/>
+                </a:solidFill>
+                <a:latin typeface="Open Sans"/>
+                <a:ea typeface="Open Sans"/>
+                <a:cs typeface="Open Sans"/>
+                <a:sym typeface="Open Sans"/>
+              </a:rPr>
+              <a:t>aplicación</a:t>
+            </a:r>
+            <a:r>
+              <a:rPr lang="en-US" sz="3399" dirty="0">
+                <a:solidFill>
+                  <a:srgbClr val="000000"/>
+                </a:solidFill>
+                <a:latin typeface="Open Sans"/>
+                <a:ea typeface="Open Sans"/>
+                <a:cs typeface="Open Sans"/>
+                <a:sym typeface="Open Sans"/>
+              </a:rPr>
+              <a:t> se </a:t>
+            </a:r>
+            <a:r>
+              <a:rPr lang="en-US" sz="3399" dirty="0" err="1">
+                <a:solidFill>
+                  <a:srgbClr val="000000"/>
+                </a:solidFill>
+                <a:latin typeface="Open Sans"/>
+                <a:ea typeface="Open Sans"/>
+                <a:cs typeface="Open Sans"/>
+                <a:sym typeface="Open Sans"/>
+              </a:rPr>
+              <a:t>espera</a:t>
+            </a:r>
+            <a:r>
+              <a:rPr lang="en-US" sz="3399" dirty="0">
+                <a:solidFill>
+                  <a:srgbClr val="000000"/>
+                </a:solidFill>
+                <a:latin typeface="Open Sans"/>
+                <a:ea typeface="Open Sans"/>
+                <a:cs typeface="Open Sans"/>
+                <a:sym typeface="Open Sans"/>
+              </a:rPr>
+              <a:t> que </a:t>
+            </a:r>
+            <a:r>
+              <a:rPr lang="en-US" sz="3399" dirty="0" err="1">
+                <a:solidFill>
+                  <a:srgbClr val="000000"/>
+                </a:solidFill>
+                <a:latin typeface="Open Sans"/>
+                <a:ea typeface="Open Sans"/>
+                <a:cs typeface="Open Sans"/>
+                <a:sym typeface="Open Sans"/>
+              </a:rPr>
+              <a:t>manipule</a:t>
+            </a:r>
+            <a:r>
+              <a:rPr lang="en-US" sz="3399" dirty="0">
+                <a:solidFill>
+                  <a:srgbClr val="000000"/>
+                </a:solidFill>
+                <a:latin typeface="Open Sans"/>
+                <a:ea typeface="Open Sans"/>
+                <a:cs typeface="Open Sans"/>
+                <a:sym typeface="Open Sans"/>
+              </a:rPr>
+              <a:t>. Al </a:t>
+            </a:r>
+            <a:r>
+              <a:rPr lang="en-US" sz="3399" dirty="0" err="1">
+                <a:solidFill>
+                  <a:srgbClr val="000000"/>
+                </a:solidFill>
+                <a:latin typeface="Open Sans"/>
+                <a:ea typeface="Open Sans"/>
+                <a:cs typeface="Open Sans"/>
+                <a:sym typeface="Open Sans"/>
+              </a:rPr>
+              <a:t>igual</a:t>
+            </a:r>
+            <a:r>
+              <a:rPr lang="en-US" sz="3399" dirty="0">
+                <a:solidFill>
+                  <a:srgbClr val="000000"/>
+                </a:solidFill>
+                <a:latin typeface="Open Sans"/>
+                <a:ea typeface="Open Sans"/>
+                <a:cs typeface="Open Sans"/>
+                <a:sym typeface="Open Sans"/>
+              </a:rPr>
+              <a:t>, se </a:t>
+            </a:r>
+            <a:r>
+              <a:rPr lang="en-US" sz="3399" dirty="0" err="1">
+                <a:solidFill>
+                  <a:srgbClr val="000000"/>
+                </a:solidFill>
+                <a:latin typeface="Open Sans"/>
+                <a:ea typeface="Open Sans"/>
+                <a:cs typeface="Open Sans"/>
+                <a:sym typeface="Open Sans"/>
+              </a:rPr>
+              <a:t>representa</a:t>
+            </a:r>
+            <a:r>
+              <a:rPr lang="en-US" sz="3399" dirty="0">
+                <a:solidFill>
+                  <a:srgbClr val="000000"/>
+                </a:solidFill>
+                <a:latin typeface="Open Sans"/>
+                <a:ea typeface="Open Sans"/>
+                <a:cs typeface="Open Sans"/>
+                <a:sym typeface="Open Sans"/>
+              </a:rPr>
+              <a:t> </a:t>
+            </a:r>
+            <a:r>
+              <a:rPr lang="en-US" sz="3399" b="1" dirty="0">
                 <a:solidFill>
                   <a:srgbClr val="000000"/>
                 </a:solidFill>
@@ -5304,16 +7028,520 @@
               <a:t>hardware </a:t>
             </a:r>
             <a:r>
-              <a:rPr lang="en-US" sz="3399">
-                <a:solidFill>
-                  <a:srgbClr val="000000"/>
-                </a:solidFill>
-                <a:latin typeface="Open Sans"/>
-                <a:ea typeface="Open Sans"/>
-                <a:cs typeface="Open Sans"/>
-                <a:sym typeface="Open Sans"/>
-              </a:rPr>
-              <a:t>que por medio de la API del sistema operativo, podrán ser usados con los permisos adecuados. Se hace enfásis de la unidad de procesamiento por el uso directo que tendrá el modelo contenido en la aplicación.</a:t>
+              <a:rPr lang="en-US" sz="3399" dirty="0">
+                <a:solidFill>
+                  <a:srgbClr val="000000"/>
+                </a:solidFill>
+                <a:latin typeface="Open Sans"/>
+                <a:ea typeface="Open Sans"/>
+                <a:cs typeface="Open Sans"/>
+                <a:sym typeface="Open Sans"/>
+              </a:rPr>
+              <a:t>que </a:t>
+            </a:r>
+            <a:r>
+              <a:rPr lang="en-US" sz="3399" dirty="0" err="1">
+                <a:solidFill>
+                  <a:srgbClr val="000000"/>
+                </a:solidFill>
+                <a:latin typeface="Open Sans"/>
+                <a:ea typeface="Open Sans"/>
+                <a:cs typeface="Open Sans"/>
+                <a:sym typeface="Open Sans"/>
+              </a:rPr>
+              <a:t>por</a:t>
+            </a:r>
+            <a:r>
+              <a:rPr lang="en-US" sz="3399" dirty="0">
+                <a:solidFill>
+                  <a:srgbClr val="000000"/>
+                </a:solidFill>
+                <a:latin typeface="Open Sans"/>
+                <a:ea typeface="Open Sans"/>
+                <a:cs typeface="Open Sans"/>
+                <a:sym typeface="Open Sans"/>
+              </a:rPr>
+              <a:t> medio de la API del </a:t>
+            </a:r>
+            <a:r>
+              <a:rPr lang="en-US" sz="3399" dirty="0" err="1">
+                <a:solidFill>
+                  <a:srgbClr val="000000"/>
+                </a:solidFill>
+                <a:latin typeface="Open Sans"/>
+                <a:ea typeface="Open Sans"/>
+                <a:cs typeface="Open Sans"/>
+                <a:sym typeface="Open Sans"/>
+              </a:rPr>
+              <a:t>sistema</a:t>
+            </a:r>
+            <a:r>
+              <a:rPr lang="en-US" sz="3399" dirty="0">
+                <a:solidFill>
+                  <a:srgbClr val="000000"/>
+                </a:solidFill>
+                <a:latin typeface="Open Sans"/>
+                <a:ea typeface="Open Sans"/>
+                <a:cs typeface="Open Sans"/>
+                <a:sym typeface="Open Sans"/>
+              </a:rPr>
+              <a:t> </a:t>
+            </a:r>
+            <a:r>
+              <a:rPr lang="en-US" sz="3399" dirty="0" err="1">
+                <a:solidFill>
+                  <a:srgbClr val="000000"/>
+                </a:solidFill>
+                <a:latin typeface="Open Sans"/>
+                <a:ea typeface="Open Sans"/>
+                <a:cs typeface="Open Sans"/>
+                <a:sym typeface="Open Sans"/>
+              </a:rPr>
+              <a:t>operativo</a:t>
+            </a:r>
+            <a:r>
+              <a:rPr lang="en-US" sz="3399" dirty="0">
+                <a:solidFill>
+                  <a:srgbClr val="000000"/>
+                </a:solidFill>
+                <a:latin typeface="Open Sans"/>
+                <a:ea typeface="Open Sans"/>
+                <a:cs typeface="Open Sans"/>
+                <a:sym typeface="Open Sans"/>
+              </a:rPr>
+              <a:t>, </a:t>
+            </a:r>
+            <a:r>
+              <a:rPr lang="en-US" sz="3399" dirty="0" err="1">
+                <a:solidFill>
+                  <a:srgbClr val="000000"/>
+                </a:solidFill>
+                <a:latin typeface="Open Sans"/>
+                <a:ea typeface="Open Sans"/>
+                <a:cs typeface="Open Sans"/>
+                <a:sym typeface="Open Sans"/>
+              </a:rPr>
+              <a:t>podrán</a:t>
+            </a:r>
+            <a:r>
+              <a:rPr lang="en-US" sz="3399" dirty="0">
+                <a:solidFill>
+                  <a:srgbClr val="000000"/>
+                </a:solidFill>
+                <a:latin typeface="Open Sans"/>
+                <a:ea typeface="Open Sans"/>
+                <a:cs typeface="Open Sans"/>
+                <a:sym typeface="Open Sans"/>
+              </a:rPr>
+              <a:t> ser </a:t>
+            </a:r>
+            <a:r>
+              <a:rPr lang="en-US" sz="3399" dirty="0" err="1">
+                <a:solidFill>
+                  <a:srgbClr val="000000"/>
+                </a:solidFill>
+                <a:latin typeface="Open Sans"/>
+                <a:ea typeface="Open Sans"/>
+                <a:cs typeface="Open Sans"/>
+                <a:sym typeface="Open Sans"/>
+              </a:rPr>
+              <a:t>usados</a:t>
+            </a:r>
+            <a:r>
+              <a:rPr lang="en-US" sz="3399" dirty="0">
+                <a:solidFill>
+                  <a:srgbClr val="000000"/>
+                </a:solidFill>
+                <a:latin typeface="Open Sans"/>
+                <a:ea typeface="Open Sans"/>
+                <a:cs typeface="Open Sans"/>
+                <a:sym typeface="Open Sans"/>
+              </a:rPr>
+              <a:t> con </a:t>
+            </a:r>
+            <a:r>
+              <a:rPr lang="en-US" sz="3399" dirty="0" err="1">
+                <a:solidFill>
+                  <a:srgbClr val="000000"/>
+                </a:solidFill>
+                <a:latin typeface="Open Sans"/>
+                <a:ea typeface="Open Sans"/>
+                <a:cs typeface="Open Sans"/>
+                <a:sym typeface="Open Sans"/>
+              </a:rPr>
+              <a:t>los</a:t>
+            </a:r>
+            <a:r>
+              <a:rPr lang="en-US" sz="3399" dirty="0">
+                <a:solidFill>
+                  <a:srgbClr val="000000"/>
+                </a:solidFill>
+                <a:latin typeface="Open Sans"/>
+                <a:ea typeface="Open Sans"/>
+                <a:cs typeface="Open Sans"/>
+                <a:sym typeface="Open Sans"/>
+              </a:rPr>
+              <a:t> </a:t>
+            </a:r>
+            <a:r>
+              <a:rPr lang="en-US" sz="3399" dirty="0" err="1">
+                <a:solidFill>
+                  <a:srgbClr val="000000"/>
+                </a:solidFill>
+                <a:latin typeface="Open Sans"/>
+                <a:ea typeface="Open Sans"/>
+                <a:cs typeface="Open Sans"/>
+                <a:sym typeface="Open Sans"/>
+              </a:rPr>
+              <a:t>permisos</a:t>
+            </a:r>
+            <a:r>
+              <a:rPr lang="en-US" sz="3399" dirty="0">
+                <a:solidFill>
+                  <a:srgbClr val="000000"/>
+                </a:solidFill>
+                <a:latin typeface="Open Sans"/>
+                <a:ea typeface="Open Sans"/>
+                <a:cs typeface="Open Sans"/>
+                <a:sym typeface="Open Sans"/>
+              </a:rPr>
+              <a:t> </a:t>
+            </a:r>
+            <a:r>
+              <a:rPr lang="en-US" sz="3399" dirty="0" err="1">
+                <a:solidFill>
+                  <a:srgbClr val="000000"/>
+                </a:solidFill>
+                <a:latin typeface="Open Sans"/>
+                <a:ea typeface="Open Sans"/>
+                <a:cs typeface="Open Sans"/>
+                <a:sym typeface="Open Sans"/>
+              </a:rPr>
+              <a:t>adecuados</a:t>
+            </a:r>
+            <a:r>
+              <a:rPr lang="en-US" sz="3399" dirty="0">
+                <a:solidFill>
+                  <a:srgbClr val="000000"/>
+                </a:solidFill>
+                <a:latin typeface="Open Sans"/>
+                <a:ea typeface="Open Sans"/>
+                <a:cs typeface="Open Sans"/>
+                <a:sym typeface="Open Sans"/>
+              </a:rPr>
+              <a:t>. Se </a:t>
+            </a:r>
+            <a:r>
+              <a:rPr lang="en-US" sz="3399" dirty="0" err="1">
+                <a:solidFill>
+                  <a:srgbClr val="000000"/>
+                </a:solidFill>
+                <a:latin typeface="Open Sans"/>
+                <a:ea typeface="Open Sans"/>
+                <a:cs typeface="Open Sans"/>
+                <a:sym typeface="Open Sans"/>
+              </a:rPr>
+              <a:t>hace</a:t>
+            </a:r>
+            <a:r>
+              <a:rPr lang="en-US" sz="3399" dirty="0">
+                <a:solidFill>
+                  <a:srgbClr val="000000"/>
+                </a:solidFill>
+                <a:latin typeface="Open Sans"/>
+                <a:ea typeface="Open Sans"/>
+                <a:cs typeface="Open Sans"/>
+                <a:sym typeface="Open Sans"/>
+              </a:rPr>
+              <a:t> </a:t>
+            </a:r>
+            <a:r>
+              <a:rPr lang="en-US" sz="3399" dirty="0" err="1">
+                <a:solidFill>
+                  <a:srgbClr val="000000"/>
+                </a:solidFill>
+                <a:latin typeface="Open Sans"/>
+                <a:ea typeface="Open Sans"/>
+                <a:cs typeface="Open Sans"/>
+                <a:sym typeface="Open Sans"/>
+              </a:rPr>
+              <a:t>enfásis</a:t>
+            </a:r>
+            <a:r>
+              <a:rPr lang="en-US" sz="3399" dirty="0">
+                <a:solidFill>
+                  <a:srgbClr val="000000"/>
+                </a:solidFill>
+                <a:latin typeface="Open Sans"/>
+                <a:ea typeface="Open Sans"/>
+                <a:cs typeface="Open Sans"/>
+                <a:sym typeface="Open Sans"/>
+              </a:rPr>
+              <a:t> de la </a:t>
+            </a:r>
+            <a:r>
+              <a:rPr lang="en-US" sz="3399" dirty="0" err="1">
+                <a:solidFill>
+                  <a:srgbClr val="000000"/>
+                </a:solidFill>
+                <a:latin typeface="Open Sans"/>
+                <a:ea typeface="Open Sans"/>
+                <a:cs typeface="Open Sans"/>
+                <a:sym typeface="Open Sans"/>
+              </a:rPr>
+              <a:t>unidad</a:t>
+            </a:r>
+            <a:r>
+              <a:rPr lang="en-US" sz="3399" dirty="0">
+                <a:solidFill>
+                  <a:srgbClr val="000000"/>
+                </a:solidFill>
+                <a:latin typeface="Open Sans"/>
+                <a:ea typeface="Open Sans"/>
+                <a:cs typeface="Open Sans"/>
+                <a:sym typeface="Open Sans"/>
+              </a:rPr>
+              <a:t> de </a:t>
+            </a:r>
+            <a:r>
+              <a:rPr lang="en-US" sz="3399" dirty="0" err="1">
+                <a:solidFill>
+                  <a:srgbClr val="000000"/>
+                </a:solidFill>
+                <a:latin typeface="Open Sans"/>
+                <a:ea typeface="Open Sans"/>
+                <a:cs typeface="Open Sans"/>
+                <a:sym typeface="Open Sans"/>
+              </a:rPr>
+              <a:t>procesamiento</a:t>
+            </a:r>
+            <a:r>
+              <a:rPr lang="en-US" sz="3399" dirty="0">
+                <a:solidFill>
+                  <a:srgbClr val="000000"/>
+                </a:solidFill>
+                <a:latin typeface="Open Sans"/>
+                <a:ea typeface="Open Sans"/>
+                <a:cs typeface="Open Sans"/>
+                <a:sym typeface="Open Sans"/>
+              </a:rPr>
+              <a:t> </a:t>
+            </a:r>
+            <a:r>
+              <a:rPr lang="en-US" sz="3399" dirty="0" err="1">
+                <a:solidFill>
+                  <a:srgbClr val="000000"/>
+                </a:solidFill>
+                <a:latin typeface="Open Sans"/>
+                <a:ea typeface="Open Sans"/>
+                <a:cs typeface="Open Sans"/>
+                <a:sym typeface="Open Sans"/>
+              </a:rPr>
+              <a:t>por</a:t>
+            </a:r>
+            <a:r>
+              <a:rPr lang="en-US" sz="3399" dirty="0">
+                <a:solidFill>
+                  <a:srgbClr val="000000"/>
+                </a:solidFill>
+                <a:latin typeface="Open Sans"/>
+                <a:ea typeface="Open Sans"/>
+                <a:cs typeface="Open Sans"/>
+                <a:sym typeface="Open Sans"/>
+              </a:rPr>
+              <a:t> la </a:t>
+            </a:r>
+            <a:r>
+              <a:rPr lang="en-US" sz="3399" dirty="0" err="1">
+                <a:solidFill>
+                  <a:srgbClr val="000000"/>
+                </a:solidFill>
+                <a:latin typeface="Open Sans"/>
+                <a:ea typeface="Open Sans"/>
+                <a:cs typeface="Open Sans"/>
+                <a:sym typeface="Open Sans"/>
+              </a:rPr>
+              <a:t>importancia</a:t>
+            </a:r>
+            <a:r>
+              <a:rPr lang="en-US" sz="3399" dirty="0">
+                <a:solidFill>
+                  <a:srgbClr val="000000"/>
+                </a:solidFill>
+                <a:latin typeface="Open Sans"/>
+                <a:ea typeface="Open Sans"/>
+                <a:cs typeface="Open Sans"/>
+                <a:sym typeface="Open Sans"/>
+              </a:rPr>
+              <a:t> que </a:t>
+            </a:r>
+            <a:r>
+              <a:rPr lang="en-US" sz="3399" dirty="0" err="1">
+                <a:solidFill>
+                  <a:srgbClr val="000000"/>
+                </a:solidFill>
+                <a:latin typeface="Open Sans"/>
+                <a:ea typeface="Open Sans"/>
+                <a:cs typeface="Open Sans"/>
+                <a:sym typeface="Open Sans"/>
+              </a:rPr>
+              <a:t>tendrá</a:t>
+            </a:r>
+            <a:r>
+              <a:rPr lang="en-US" sz="3399" dirty="0">
+                <a:solidFill>
+                  <a:srgbClr val="000000"/>
+                </a:solidFill>
+                <a:latin typeface="Open Sans"/>
+                <a:ea typeface="Open Sans"/>
+                <a:cs typeface="Open Sans"/>
+                <a:sym typeface="Open Sans"/>
+              </a:rPr>
+              <a:t> </a:t>
+            </a:r>
+            <a:r>
+              <a:rPr lang="en-US" sz="3399" dirty="0" err="1">
+                <a:solidFill>
+                  <a:srgbClr val="000000"/>
+                </a:solidFill>
+                <a:latin typeface="Open Sans"/>
+                <a:ea typeface="Open Sans"/>
+                <a:cs typeface="Open Sans"/>
+                <a:sym typeface="Open Sans"/>
+              </a:rPr>
+              <a:t>en</a:t>
+            </a:r>
+            <a:r>
+              <a:rPr lang="en-US" sz="3399" dirty="0">
+                <a:solidFill>
+                  <a:srgbClr val="000000"/>
+                </a:solidFill>
+                <a:latin typeface="Open Sans"/>
+                <a:ea typeface="Open Sans"/>
+                <a:cs typeface="Open Sans"/>
+                <a:sym typeface="Open Sans"/>
+              </a:rPr>
+              <a:t> </a:t>
+            </a:r>
+            <a:r>
+              <a:rPr lang="en-US" sz="3399" dirty="0" err="1">
+                <a:solidFill>
+                  <a:srgbClr val="000000"/>
+                </a:solidFill>
+                <a:latin typeface="Open Sans"/>
+                <a:ea typeface="Open Sans"/>
+                <a:cs typeface="Open Sans"/>
+                <a:sym typeface="Open Sans"/>
+              </a:rPr>
+              <a:t>el</a:t>
+            </a:r>
+            <a:r>
+              <a:rPr lang="en-US" sz="3399" dirty="0">
+                <a:solidFill>
+                  <a:srgbClr val="000000"/>
+                </a:solidFill>
+                <a:latin typeface="Open Sans"/>
+                <a:ea typeface="Open Sans"/>
+                <a:cs typeface="Open Sans"/>
+                <a:sym typeface="Open Sans"/>
+              </a:rPr>
+              <a:t> </a:t>
+            </a:r>
+            <a:r>
+              <a:rPr lang="en-US" sz="3399" dirty="0" err="1">
+                <a:solidFill>
+                  <a:srgbClr val="000000"/>
+                </a:solidFill>
+                <a:latin typeface="Open Sans"/>
+                <a:ea typeface="Open Sans"/>
+                <a:cs typeface="Open Sans"/>
+                <a:sym typeface="Open Sans"/>
+              </a:rPr>
+              <a:t>modelo</a:t>
+            </a:r>
+            <a:r>
+              <a:rPr lang="en-US" sz="3399" dirty="0">
+                <a:solidFill>
+                  <a:srgbClr val="000000"/>
+                </a:solidFill>
+                <a:latin typeface="Open Sans"/>
+                <a:ea typeface="Open Sans"/>
+                <a:cs typeface="Open Sans"/>
+                <a:sym typeface="Open Sans"/>
+              </a:rPr>
+              <a:t> </a:t>
+            </a:r>
+            <a:r>
+              <a:rPr lang="en-US" sz="3399" dirty="0" err="1">
+                <a:solidFill>
+                  <a:srgbClr val="000000"/>
+                </a:solidFill>
+                <a:latin typeface="Open Sans"/>
+                <a:ea typeface="Open Sans"/>
+                <a:cs typeface="Open Sans"/>
+                <a:sym typeface="Open Sans"/>
+              </a:rPr>
+              <a:t>contenido</a:t>
+            </a:r>
+            <a:r>
+              <a:rPr lang="en-US" sz="3399" dirty="0">
+                <a:solidFill>
+                  <a:srgbClr val="000000"/>
+                </a:solidFill>
+                <a:latin typeface="Open Sans"/>
+                <a:ea typeface="Open Sans"/>
+                <a:cs typeface="Open Sans"/>
+                <a:sym typeface="Open Sans"/>
+              </a:rPr>
+              <a:t> </a:t>
+            </a:r>
+            <a:r>
+              <a:rPr lang="en-US" sz="3399" dirty="0" err="1">
+                <a:solidFill>
+                  <a:srgbClr val="000000"/>
+                </a:solidFill>
+                <a:latin typeface="Open Sans"/>
+                <a:ea typeface="Open Sans"/>
+                <a:cs typeface="Open Sans"/>
+                <a:sym typeface="Open Sans"/>
+              </a:rPr>
+              <a:t>en</a:t>
+            </a:r>
+            <a:r>
+              <a:rPr lang="en-US" sz="3399" dirty="0">
+                <a:solidFill>
+                  <a:srgbClr val="000000"/>
+                </a:solidFill>
+                <a:latin typeface="Open Sans"/>
+                <a:ea typeface="Open Sans"/>
+                <a:cs typeface="Open Sans"/>
+                <a:sym typeface="Open Sans"/>
+              </a:rPr>
+              <a:t> la </a:t>
+            </a:r>
+            <a:r>
+              <a:rPr lang="en-US" sz="3399" dirty="0" err="1">
+                <a:solidFill>
+                  <a:srgbClr val="000000"/>
+                </a:solidFill>
+                <a:latin typeface="Open Sans"/>
+                <a:ea typeface="Open Sans"/>
+                <a:cs typeface="Open Sans"/>
+                <a:sym typeface="Open Sans"/>
+              </a:rPr>
+              <a:t>aplicación</a:t>
+            </a:r>
+            <a:r>
+              <a:rPr lang="en-US" sz="3399" dirty="0">
+                <a:solidFill>
+                  <a:srgbClr val="000000"/>
+                </a:solidFill>
+                <a:latin typeface="Open Sans"/>
+                <a:ea typeface="Open Sans"/>
+                <a:cs typeface="Open Sans"/>
+                <a:sym typeface="Open Sans"/>
+              </a:rPr>
+              <a:t>.</a:t>
             </a:r>
           </a:p>
         </p:txBody>
@@ -5326,215 +7554,7 @@
 </p:sld>
 </file>
 
-<file path=ppt/slides/slide2.xml><?xml version="1.0" encoding="utf-8"?>
-<p:sld xmlns:a="http://schemas.openxmlformats.org/drawingml/2006/main" xmlns:r="http://schemas.openxmlformats.org/officeDocument/2006/relationships" xmlns:p="http://schemas.openxmlformats.org/presentationml/2006/main">
-  <p:cSld>
-    <p:spTree>
-      <p:nvGrpSpPr>
-        <p:cNvPr id="1" name=""/>
-        <p:cNvGrpSpPr/>
-        <p:nvPr/>
-      </p:nvGrpSpPr>
-      <p:grpSpPr>
-        <a:xfrm>
-          <a:off x="0" y="0"/>
-          <a:ext cx="0" cy="0"/>
-          <a:chOff x="0" y="0"/>
-          <a:chExt cx="0" cy="0"/>
-        </a:xfrm>
-      </p:grpSpPr>
-      <p:sp>
-        <p:nvSpPr>
-          <p:cNvPr id="2" name="TextBox 2"/>
-          <p:cNvSpPr txBox="1"/>
-          <p:nvPr/>
-        </p:nvSpPr>
-        <p:spPr>
-          <a:xfrm>
-            <a:off x="4424429" y="3619817"/>
-            <a:ext cx="9439141" cy="3580765"/>
-          </a:xfrm>
-          <a:prstGeom prst="rect">
-            <a:avLst/>
-          </a:prstGeom>
-        </p:spPr>
-        <p:txBody>
-          <a:bodyPr lIns="0" tIns="0" rIns="0" bIns="0" rtlCol="0" anchor="t">
-            <a:spAutoFit/>
-          </a:bodyPr>
-          <a:lstStyle/>
-          <a:p>
-            <a:pPr marL="734059" lvl="1" indent="-367030" algn="ctr">
-              <a:lnSpc>
-                <a:spcPts val="4759"/>
-              </a:lnSpc>
-              <a:buAutoNum type="arabicPeriod"/>
-            </a:pPr>
-            <a:r>
-              <a:rPr lang="en-US" sz="3399">
-                <a:solidFill>
-                  <a:srgbClr val="000000"/>
-                </a:solidFill>
-                <a:latin typeface="Open Sans"/>
-                <a:ea typeface="Open Sans"/>
-                <a:cs typeface="Open Sans"/>
-                <a:sym typeface="Open Sans"/>
-              </a:rPr>
-              <a:t>Vista Lógica</a:t>
-            </a:r>
-          </a:p>
-          <a:p>
-            <a:pPr marL="734059" lvl="1" indent="-367030" algn="ctr">
-              <a:lnSpc>
-                <a:spcPts val="4759"/>
-              </a:lnSpc>
-              <a:buAutoNum type="arabicPeriod"/>
-            </a:pPr>
-            <a:r>
-              <a:rPr lang="en-US" sz="3399">
-                <a:solidFill>
-                  <a:srgbClr val="000000"/>
-                </a:solidFill>
-                <a:latin typeface="Open Sans"/>
-                <a:ea typeface="Open Sans"/>
-                <a:cs typeface="Open Sans"/>
-                <a:sym typeface="Open Sans"/>
-              </a:rPr>
-              <a:t>Vista de Componentes</a:t>
-            </a:r>
-          </a:p>
-          <a:p>
-            <a:pPr marL="734059" lvl="1" indent="-367030" algn="ctr">
-              <a:lnSpc>
-                <a:spcPts val="4759"/>
-              </a:lnSpc>
-              <a:buAutoNum type="arabicPeriod"/>
-            </a:pPr>
-            <a:r>
-              <a:rPr lang="en-US" sz="3399">
-                <a:solidFill>
-                  <a:srgbClr val="000000"/>
-                </a:solidFill>
-                <a:latin typeface="Open Sans"/>
-                <a:ea typeface="Open Sans"/>
-                <a:cs typeface="Open Sans"/>
-                <a:sym typeface="Open Sans"/>
-              </a:rPr>
-              <a:t>Requerimientos No Funcionales</a:t>
-            </a:r>
-          </a:p>
-          <a:p>
-            <a:pPr marL="734059" lvl="1" indent="-367030" algn="ctr">
-              <a:lnSpc>
-                <a:spcPts val="4759"/>
-              </a:lnSpc>
-              <a:buAutoNum type="arabicPeriod"/>
-            </a:pPr>
-            <a:r>
-              <a:rPr lang="en-US" sz="3399">
-                <a:solidFill>
-                  <a:srgbClr val="000000"/>
-                </a:solidFill>
-                <a:latin typeface="Open Sans"/>
-                <a:ea typeface="Open Sans"/>
-                <a:cs typeface="Open Sans"/>
-                <a:sym typeface="Open Sans"/>
-              </a:rPr>
-              <a:t>Vista de Procesos</a:t>
-            </a:r>
-          </a:p>
-          <a:p>
-            <a:pPr marL="734059" lvl="1" indent="-367030" algn="ctr">
-              <a:lnSpc>
-                <a:spcPts val="4759"/>
-              </a:lnSpc>
-              <a:buAutoNum type="arabicPeriod"/>
-            </a:pPr>
-            <a:r>
-              <a:rPr lang="en-US" sz="3399">
-                <a:solidFill>
-                  <a:srgbClr val="000000"/>
-                </a:solidFill>
-                <a:latin typeface="Open Sans"/>
-                <a:ea typeface="Open Sans"/>
-                <a:cs typeface="Open Sans"/>
-                <a:sym typeface="Open Sans"/>
-              </a:rPr>
-              <a:t>Vista Física</a:t>
-            </a:r>
-          </a:p>
-          <a:p>
-            <a:pPr marL="734059" lvl="1" indent="-367030" algn="ctr">
-              <a:lnSpc>
-                <a:spcPts val="4759"/>
-              </a:lnSpc>
-              <a:buAutoNum type="arabicPeriod"/>
-            </a:pPr>
-            <a:r>
-              <a:rPr lang="en-US" sz="3399">
-                <a:solidFill>
-                  <a:srgbClr val="000000"/>
-                </a:solidFill>
-                <a:latin typeface="Open Sans"/>
-                <a:ea typeface="Open Sans"/>
-                <a:cs typeface="Open Sans"/>
-                <a:sym typeface="Open Sans"/>
-              </a:rPr>
-              <a:t>Escenarios</a:t>
-            </a:r>
-          </a:p>
-        </p:txBody>
-      </p:sp>
-      <p:sp>
-        <p:nvSpPr>
-          <p:cNvPr id="3" name="TextBox 3"/>
-          <p:cNvSpPr txBox="1"/>
-          <p:nvPr/>
-        </p:nvSpPr>
-        <p:spPr>
-          <a:xfrm>
-            <a:off x="7909203" y="537527"/>
-            <a:ext cx="2469594" cy="887095"/>
-          </a:xfrm>
-          <a:prstGeom prst="rect">
-            <a:avLst/>
-          </a:prstGeom>
-        </p:spPr>
-        <p:txBody>
-          <a:bodyPr lIns="0" tIns="0" rIns="0" bIns="0" rtlCol="0" anchor="t">
-            <a:spAutoFit/>
-          </a:bodyPr>
-          <a:lstStyle/>
-          <a:p>
-            <a:pPr algn="ctr">
-              <a:lnSpc>
-                <a:spcPts val="7279"/>
-              </a:lnSpc>
-            </a:pPr>
-            <a:r>
-              <a:rPr lang="en-US" sz="5199" b="1">
-                <a:solidFill>
-                  <a:srgbClr val="000000"/>
-                </a:solidFill>
-                <a:latin typeface="Open Sans Bold"/>
-                <a:ea typeface="Open Sans Bold"/>
-                <a:cs typeface="Open Sans Bold"/>
-                <a:sym typeface="Open Sans Bold"/>
-              </a:rPr>
-              <a:t>Agenda</a:t>
-            </a:r>
-          </a:p>
-        </p:txBody>
-      </p:sp>
-    </p:spTree>
-  </p:cSld>
-  <p:clrMapOvr>
-    <a:masterClrMapping/>
-  </p:clrMapOvr>
-</p:sld>
-</file>
-
-<file path=ppt/slides/slide20.xml><?xml version="1.0" encoding="utf-8"?>
+<file path=ppt/slides/slide22.xml><?xml version="1.0" encoding="utf-8"?>
 <p:sld xmlns:a="http://schemas.openxmlformats.org/drawingml/2006/main" xmlns:r="http://schemas.openxmlformats.org/officeDocument/2006/relationships" xmlns:p="http://schemas.openxmlformats.org/presentationml/2006/main">
   <p:cSld>
     <p:spTree>
@@ -5605,8 +7625,8 @@
         </p:nvSpPr>
         <p:spPr>
           <a:xfrm>
-            <a:off x="7126217" y="495300"/>
-            <a:ext cx="4035564" cy="887095"/>
+            <a:off x="7240517" y="495300"/>
+            <a:ext cx="3806964" cy="887095"/>
           </a:xfrm>
           <a:prstGeom prst="rect">
             <a:avLst/>
@@ -5655,7 +7675,7 @@
 </p:sld>
 </file>
 
-<file path=ppt/slides/slide21.xml><?xml version="1.0" encoding="utf-8"?>
+<file path=ppt/slides/slide23.xml><?xml version="1.0" encoding="utf-8"?>
 <p:sld xmlns:a="http://schemas.openxmlformats.org/drawingml/2006/main" xmlns:r="http://schemas.openxmlformats.org/officeDocument/2006/relationships" xmlns:p="http://schemas.openxmlformats.org/presentationml/2006/main">
   <p:cSld>
     <p:spTree>
@@ -5721,15 +7741,15 @@
         </p:nvSpPr>
         <p:spPr>
           <a:xfrm>
-            <a:off x="7284302" y="537527"/>
-            <a:ext cx="3917097" cy="887095"/>
+            <a:off x="7284303" y="537527"/>
+            <a:ext cx="3719394" cy="887095"/>
           </a:xfrm>
           <a:prstGeom prst="rect">
             <a:avLst/>
           </a:prstGeom>
         </p:spPr>
         <p:txBody>
-          <a:bodyPr wrap="square" lIns="0" tIns="0" rIns="0" bIns="0" rtlCol="0" anchor="t">
+          <a:bodyPr lIns="0" tIns="0" rIns="0" bIns="0" rtlCol="0" anchor="t">
             <a:spAutoFit/>
           </a:bodyPr>
           <a:lstStyle/>
@@ -5774,7 +7794,7 @@
 </p:sld>
 </file>
 
-<file path=ppt/slides/slide22.xml><?xml version="1.0" encoding="utf-8"?>
+<file path=ppt/slides/slide24.xml><?xml version="1.0" encoding="utf-8"?>
 <p:sld xmlns:a="http://schemas.openxmlformats.org/drawingml/2006/main" xmlns:r="http://schemas.openxmlformats.org/officeDocument/2006/relationships" xmlns:p="http://schemas.openxmlformats.org/presentationml/2006/main">
   <p:cSld>
     <p:spTree>
@@ -5845,8 +7865,8 @@
         </p:nvSpPr>
         <p:spPr>
           <a:xfrm>
-            <a:off x="7394436" y="537527"/>
-            <a:ext cx="3730764" cy="887095"/>
+            <a:off x="7316717" y="537528"/>
+            <a:ext cx="3654564" cy="887095"/>
           </a:xfrm>
           <a:prstGeom prst="rect">
             <a:avLst/>
@@ -5925,7 +7945,7 @@
 </p:sld>
 </file>
 
-<file path=ppt/slides/slide23.xml><?xml version="1.0" encoding="utf-8"?>
+<file path=ppt/slides/slide25.xml><?xml version="1.0" encoding="utf-8"?>
 <p:sld xmlns:a="http://schemas.openxmlformats.org/drawingml/2006/main" xmlns:r="http://schemas.openxmlformats.org/officeDocument/2006/relationships" xmlns:p="http://schemas.openxmlformats.org/presentationml/2006/main">
   <p:cSld>
     <p:spTree>
@@ -5991,15 +8011,15 @@
         </p:nvSpPr>
         <p:spPr>
           <a:xfrm>
-            <a:off x="7284302" y="537527"/>
-            <a:ext cx="4145697" cy="887095"/>
+            <a:off x="7284303" y="537527"/>
+            <a:ext cx="3719394" cy="887095"/>
           </a:xfrm>
           <a:prstGeom prst="rect">
             <a:avLst/>
           </a:prstGeom>
         </p:spPr>
         <p:txBody>
-          <a:bodyPr wrap="square" lIns="0" tIns="0" rIns="0" bIns="0" rtlCol="0" anchor="t">
+          <a:bodyPr lIns="0" tIns="0" rIns="0" bIns="0" rtlCol="0" anchor="t">
             <a:spAutoFit/>
           </a:bodyPr>
           <a:lstStyle/>
@@ -6010,28 +8030,16 @@
               </a:lnSpc>
             </a:pPr>
             <a:r>
-              <a:rPr lang="en-US" sz="5199" b="1" dirty="0" err="1">
-                <a:solidFill>
-                  <a:srgbClr val="000000"/>
-                </a:solidFill>
-                <a:latin typeface="Open Sans Bold"/>
-                <a:ea typeface="Open Sans Bold"/>
-                <a:cs typeface="Open Sans Bold"/>
-                <a:sym typeface="Open Sans Bold"/>
-              </a:rPr>
-              <a:t>Escenario</a:t>
-            </a:r>
-            <a:r>
-              <a:rPr lang="en-US" sz="5199" b="1" dirty="0">
-                <a:solidFill>
-                  <a:srgbClr val="000000"/>
-                </a:solidFill>
-                <a:latin typeface="Open Sans Bold"/>
-                <a:ea typeface="Open Sans Bold"/>
-                <a:cs typeface="Open Sans Bold"/>
-                <a:sym typeface="Open Sans Bold"/>
-              </a:rPr>
-              <a:t> 2</a:t>
+              <a:rPr lang="en-US" sz="5199" b="1">
+                <a:solidFill>
+                  <a:srgbClr val="000000"/>
+                </a:solidFill>
+                <a:latin typeface="Open Sans Bold"/>
+                <a:ea typeface="Open Sans Bold"/>
+                <a:cs typeface="Open Sans Bold"/>
+                <a:sym typeface="Open Sans Bold"/>
+              </a:rPr>
+              <a:t>Escenario 2</a:t>
             </a:r>
           </a:p>
         </p:txBody>
@@ -6069,8 +8077,8 @@
         </p:nvSpPr>
         <p:spPr>
           <a:xfrm>
-            <a:off x="6337488" y="585152"/>
-            <a:ext cx="5613023" cy="887095"/>
+            <a:off x="6756588" y="585152"/>
+            <a:ext cx="4774823" cy="887095"/>
           </a:xfrm>
           <a:prstGeom prst="rect">
             <a:avLst/>
@@ -6361,7 +8369,7 @@
               </a:lnSpc>
             </a:pPr>
             <a:r>
-              <a:rPr lang="en-US" sz="5199" b="1" dirty="0" err="1">
+              <a:rPr lang="en-US" sz="5199" b="1">
                 <a:solidFill>
                   <a:srgbClr val="000000"/>
                 </a:solidFill>
@@ -6372,15 +8380,6 @@
               </a:rPr>
               <a:t>Catálogo</a:t>
             </a:r>
-            <a:endParaRPr lang="en-US" sz="5199" b="1" dirty="0">
-              <a:solidFill>
-                <a:srgbClr val="000000"/>
-              </a:solidFill>
-              <a:latin typeface="Open Sans Bold"/>
-              <a:ea typeface="Open Sans Bold"/>
-              <a:cs typeface="Open Sans Bold"/>
-              <a:sym typeface="Open Sans Bold"/>
-            </a:endParaRPr>
           </a:p>
         </p:txBody>
       </p:sp>
@@ -7499,8 +9498,8 @@
         </p:nvSpPr>
         <p:spPr>
           <a:xfrm>
-            <a:off x="3119631" y="1424623"/>
-            <a:ext cx="12048738" cy="8795579"/>
+            <a:off x="3813247" y="1424623"/>
+            <a:ext cx="10661507" cy="8862377"/>
           </a:xfrm>
           <a:custGeom>
             <a:avLst/>
@@ -7509,18 +9508,18 @@
             <a:cxnLst/>
             <a:rect l="l" t="t" r="r" b="b"/>
             <a:pathLst>
-              <a:path w="12048738" h="8795579">
+              <a:path w="10661507" h="8862377">
                 <a:moveTo>
                   <a:pt x="0" y="0"/>
                 </a:moveTo>
                 <a:lnTo>
-                  <a:pt x="12048738" y="0"/>
+                  <a:pt x="10661506" y="0"/>
                 </a:lnTo>
                 <a:lnTo>
-                  <a:pt x="12048738" y="8795579"/>
+                  <a:pt x="10661506" y="8862377"/>
                 </a:lnTo>
                 <a:lnTo>
-                  <a:pt x="0" y="8795579"/>
+                  <a:pt x="0" y="8862377"/>
                 </a:lnTo>
                 <a:lnTo>
                   <a:pt x="0" y="0"/>

</xml_diff>